<commit_message>
small modifications to slides on other language processors
</commit_message>
<xml_diff>
--- a/PowerPoint Slides/01 - Overview of Compilers.pptx
+++ b/PowerPoint Slides/01 - Overview of Compilers.pptx
@@ -7075,60 +7075,6 @@
       </p:grpSpPr>
       <p:sp>
         <p:nvSpPr>
-          <p:cNvPr id="12290" name="Footer Placeholder 3"/>
-          <p:cNvSpPr>
-            <a:spLocks noGrp="1"/>
-          </p:cNvSpPr>
-          <p:nvPr>
-            <p:ph type="ftr" sz="quarter" idx="10"/>
-          </p:nvPr>
-        </p:nvSpPr>
-        <p:spPr>
-          <a:noFill/>
-        </p:spPr>
-        <p:txBody>
-          <a:bodyPr/>
-          <a:lstStyle/>
-          <a:p>
-            <a:r>
-              <a:rPr lang="en-US"/>
-              <a:t>©SoftMoore Consulting</a:t>
-            </a:r>
-          </a:p>
-        </p:txBody>
-      </p:sp>
-      <p:sp>
-        <p:nvSpPr>
-          <p:cNvPr id="12291" name="Slide Number Placeholder 4"/>
-          <p:cNvSpPr>
-            <a:spLocks noGrp="1"/>
-          </p:cNvSpPr>
-          <p:nvPr>
-            <p:ph type="sldNum" sz="quarter" idx="11"/>
-          </p:nvPr>
-        </p:nvSpPr>
-        <p:spPr>
-          <a:noFill/>
-        </p:spPr>
-        <p:txBody>
-          <a:bodyPr/>
-          <a:lstStyle/>
-          <a:p>
-            <a:r>
-              <a:rPr lang="en-US"/>
-              <a:t>Slide </a:t>
-            </a:r>
-            <a:fld id="{12AD52E1-D5AA-46F0-8084-63A2D1158803}" type="slidenum">
-              <a:rPr lang="en-US" smtClean="0"/>
-              <a:pPr/>
-              <a:t>10</a:t>
-            </a:fld>
-            <a:endParaRPr lang="en-US"/>
-          </a:p>
-        </p:txBody>
-      </p:sp>
-      <p:sp>
-        <p:nvSpPr>
           <p:cNvPr id="12292" name="Rectangle 2"/>
           <p:cNvSpPr>
             <a:spLocks noGrp="1" noChangeArrowheads="1"/>
@@ -7143,8 +7089,8 @@
           <a:lstStyle/>
           <a:p>
             <a:r>
-              <a:rPr lang="en-US"/>
-              <a:t>Diagnostic Tools</a:t>
+              <a:rPr lang="en-US" dirty="0"/>
+              <a:t>Integrated Development Environment (IDE) </a:t>
             </a:r>
           </a:p>
         </p:txBody>
@@ -7166,39 +7112,91 @@
           <a:p>
             <a:r>
               <a:rPr lang="en-US" dirty="0"/>
-              <a:t>Error reports</a:t>
+              <a:t>Syntax-directed editor</a:t>
             </a:r>
           </a:p>
           <a:p>
             <a:r>
               <a:rPr lang="en-US" dirty="0"/>
-              <a:t>Cross reference maps</a:t>
+              <a:t>Source code formatter</a:t>
             </a:r>
           </a:p>
           <a:p>
             <a:r>
               <a:rPr lang="en-US" dirty="0"/>
-              <a:t>Run time profilers</a:t>
+              <a:t>Error reporting</a:t>
             </a:r>
           </a:p>
           <a:p>
             <a:r>
               <a:rPr lang="en-US" dirty="0"/>
-              <a:t>Source level debuggers</a:t>
+              <a:t>Refactoring</a:t>
             </a:r>
           </a:p>
           <a:p>
             <a:r>
               <a:rPr lang="en-US" dirty="0"/>
-              <a:t>Disassemblers</a:t>
+              <a:t>Source level debugger</a:t>
             </a:r>
           </a:p>
           <a:p>
             <a:r>
-              <a:rPr lang="en-US" dirty="0" err="1"/>
-              <a:t>Decompilers</a:t>
+              <a:rPr lang="en-US" dirty="0"/>
+              <a:t>Run time profiler</a:t>
             </a:r>
+          </a:p>
+          <a:p>
             <a:endParaRPr lang="en-US" dirty="0"/>
+          </a:p>
+        </p:txBody>
+      </p:sp>
+      <p:sp>
+        <p:nvSpPr>
+          <p:cNvPr id="12290" name="Footer Placeholder 3"/>
+          <p:cNvSpPr>
+            <a:spLocks noGrp="1"/>
+          </p:cNvSpPr>
+          <p:nvPr>
+            <p:ph type="ftr" sz="quarter" idx="10"/>
+          </p:nvPr>
+        </p:nvSpPr>
+        <p:spPr/>
+        <p:txBody>
+          <a:bodyPr/>
+          <a:lstStyle/>
+          <a:p>
+            <a:r>
+              <a:rPr lang="en-US"/>
+              <a:t>©SoftMoore Consulting</a:t>
+            </a:r>
+          </a:p>
+        </p:txBody>
+      </p:sp>
+      <p:sp>
+        <p:nvSpPr>
+          <p:cNvPr id="12291" name="Slide Number Placeholder 4"/>
+          <p:cNvSpPr>
+            <a:spLocks noGrp="1"/>
+          </p:cNvSpPr>
+          <p:nvPr>
+            <p:ph type="sldNum" sz="quarter" idx="11"/>
+          </p:nvPr>
+        </p:nvSpPr>
+        <p:spPr/>
+        <p:txBody>
+          <a:bodyPr/>
+          <a:lstStyle/>
+          <a:p>
+            <a:r>
+              <a:rPr lang="en-US"/>
+              <a:t>Slide </a:t>
+            </a:r>
+            <a:fld id="{12AD52E1-D5AA-46F0-8084-63A2D1158803}" type="slidenum">
+              <a:rPr lang="en-US" smtClean="0"/>
+              <a:pPr/>
+              <a:t>10</a:t>
+            </a:fld>
+            <a:endParaRPr lang="en-US"/>
           </a:p>
         </p:txBody>
       </p:sp>
@@ -33753,7 +33751,7 @@
           </p:nvSpPr>
           <p:spPr bwMode="auto">
             <a:xfrm>
-              <a:off x="4114800" y="4419600"/>
+              <a:off x="4116972" y="4419600"/>
               <a:ext cx="914400" cy="914400"/>
             </a:xfrm>
             <a:prstGeom prst="rect">
@@ -34257,7 +34255,7 @@
           </p:nvSpPr>
           <p:spPr bwMode="auto">
             <a:xfrm>
-              <a:off x="4114596" y="5334000"/>
+              <a:off x="4116972" y="5334000"/>
               <a:ext cx="914400" cy="731520"/>
             </a:xfrm>
             <a:prstGeom prst="flowChartOffpageConnector">
@@ -42783,60 +42781,6 @@
       </p:grpSpPr>
       <p:sp>
         <p:nvSpPr>
-          <p:cNvPr id="11266" name="Footer Placeholder 3"/>
-          <p:cNvSpPr>
-            <a:spLocks noGrp="1"/>
-          </p:cNvSpPr>
-          <p:nvPr>
-            <p:ph type="ftr" sz="quarter" idx="10"/>
-          </p:nvPr>
-        </p:nvSpPr>
-        <p:spPr>
-          <a:noFill/>
-        </p:spPr>
-        <p:txBody>
-          <a:bodyPr/>
-          <a:lstStyle/>
-          <a:p>
-            <a:r>
-              <a:rPr lang="en-US"/>
-              <a:t>©SoftMoore Consulting</a:t>
-            </a:r>
-          </a:p>
-        </p:txBody>
-      </p:sp>
-      <p:sp>
-        <p:nvSpPr>
-          <p:cNvPr id="11267" name="Slide Number Placeholder 4"/>
-          <p:cNvSpPr>
-            <a:spLocks noGrp="1"/>
-          </p:cNvSpPr>
-          <p:nvPr>
-            <p:ph type="sldNum" sz="quarter" idx="11"/>
-          </p:nvPr>
-        </p:nvSpPr>
-        <p:spPr>
-          <a:noFill/>
-        </p:spPr>
-        <p:txBody>
-          <a:bodyPr/>
-          <a:lstStyle/>
-          <a:p>
-            <a:r>
-              <a:rPr lang="en-US"/>
-              <a:t>Slide </a:t>
-            </a:r>
-            <a:fld id="{7109F165-252E-40CA-B102-7EB147AE6585}" type="slidenum">
-              <a:rPr lang="en-US" smtClean="0"/>
-              <a:pPr/>
-              <a:t>9</a:t>
-            </a:fld>
-            <a:endParaRPr lang="en-US"/>
-          </a:p>
-        </p:txBody>
-      </p:sp>
-      <p:sp>
-        <p:nvSpPr>
           <p:cNvPr id="11268" name="Rectangle 2"/>
           <p:cNvSpPr>
             <a:spLocks noGrp="1" noChangeArrowheads="1"/>
@@ -42873,7 +42817,7 @@
           <a:lstStyle/>
           <a:p>
             <a:r>
-              <a:rPr lang="en-US" sz="2300" dirty="0"/>
+              <a:rPr lang="en-US" dirty="0"/>
               <a:t>Assembler</a:t>
             </a:r>
           </a:p>
@@ -42886,7 +42830,7 @@
           </a:p>
           <a:p>
             <a:r>
-              <a:rPr lang="en-US" sz="2300" dirty="0"/>
+              <a:rPr lang="en-US" dirty="0"/>
               <a:t>High-level language translator (a.k.a., transpiler)</a:t>
             </a:r>
           </a:p>
@@ -42899,39 +42843,84 @@
           </a:p>
           <a:p>
             <a:r>
-              <a:rPr lang="en-US" sz="2300" dirty="0"/>
+              <a:rPr lang="en-US" dirty="0"/>
               <a:t>Interpreter (more on this topic in subsequent slides)</a:t>
             </a:r>
           </a:p>
           <a:p>
             <a:r>
-              <a:rPr lang="en-US" sz="2300" dirty="0"/>
-              <a:t>Syntax-directed editors</a:t>
-            </a:r>
-          </a:p>
-          <a:p>
-            <a:r>
-              <a:rPr lang="en-US" sz="2300" dirty="0"/>
-              <a:t>Source code formatters/pretty printers</a:t>
-            </a:r>
-          </a:p>
-          <a:p>
-            <a:r>
-              <a:rPr lang="en-US" sz="2300" dirty="0"/>
+              <a:rPr lang="en-US" dirty="0"/>
               <a:t>Testing/Re-engineering tools</a:t>
             </a:r>
           </a:p>
           <a:p>
             <a:r>
-              <a:rPr lang="en-US" sz="2300" dirty="0"/>
+              <a:rPr lang="en-US" dirty="0"/>
               <a:t>Macro preprocessors</a:t>
             </a:r>
           </a:p>
           <a:p>
             <a:r>
-              <a:rPr lang="en-US" sz="2300" dirty="0"/>
-              <a:t>Linker/Loader</a:t>
+              <a:rPr lang="en-US" dirty="0"/>
+              <a:t>Disassemblers</a:t>
             </a:r>
+          </a:p>
+          <a:p>
+            <a:r>
+              <a:rPr lang="en-US" dirty="0" err="1"/>
+              <a:t>Decompilers</a:t>
+            </a:r>
+            <a:endParaRPr lang="en-US" dirty="0"/>
+          </a:p>
+        </p:txBody>
+      </p:sp>
+      <p:sp>
+        <p:nvSpPr>
+          <p:cNvPr id="11266" name="Footer Placeholder 3"/>
+          <p:cNvSpPr>
+            <a:spLocks noGrp="1"/>
+          </p:cNvSpPr>
+          <p:nvPr>
+            <p:ph type="ftr" sz="quarter" idx="10"/>
+          </p:nvPr>
+        </p:nvSpPr>
+        <p:spPr/>
+        <p:txBody>
+          <a:bodyPr/>
+          <a:lstStyle/>
+          <a:p>
+            <a:r>
+              <a:rPr lang="en-US"/>
+              <a:t>©SoftMoore Consulting</a:t>
+            </a:r>
+          </a:p>
+        </p:txBody>
+      </p:sp>
+      <p:sp>
+        <p:nvSpPr>
+          <p:cNvPr id="11267" name="Slide Number Placeholder 4"/>
+          <p:cNvSpPr>
+            <a:spLocks noGrp="1"/>
+          </p:cNvSpPr>
+          <p:nvPr>
+            <p:ph type="sldNum" sz="quarter" idx="11"/>
+          </p:nvPr>
+        </p:nvSpPr>
+        <p:spPr/>
+        <p:txBody>
+          <a:bodyPr/>
+          <a:lstStyle/>
+          <a:p>
+            <a:r>
+              <a:rPr lang="en-US"/>
+              <a:t>Slide </a:t>
+            </a:r>
+            <a:fld id="{7109F165-252E-40CA-B102-7EB147AE6585}" type="slidenum">
+              <a:rPr lang="en-US" smtClean="0"/>
+              <a:pPr/>
+              <a:t>9</a:t>
+            </a:fld>
+            <a:endParaRPr lang="en-US"/>
           </a:p>
         </p:txBody>
       </p:sp>

</xml_diff>

<commit_message>
added handout on JShell; modified/simplified slides on bootstrapping
</commit_message>
<xml_diff>
--- a/PowerPoint Slides/01 - Overview of Compilers.pptx
+++ b/PowerPoint Slides/01 - Overview of Compilers.pptx
@@ -5,10 +5,10 @@
     <p:sldMasterId id="2147483651" r:id="rId1"/>
   </p:sldMasterIdLst>
   <p:notesMasterIdLst>
-    <p:notesMasterId r:id="rId42"/>
+    <p:notesMasterId r:id="rId41"/>
   </p:notesMasterIdLst>
   <p:handoutMasterIdLst>
-    <p:handoutMasterId r:id="rId43"/>
+    <p:handoutMasterId r:id="rId42"/>
   </p:handoutMasterIdLst>
   <p:sldIdLst>
     <p:sldId id="256" r:id="rId2"/>
@@ -41,19 +41,18 @@
     <p:sldId id="300" r:id="rId29"/>
     <p:sldId id="301" r:id="rId30"/>
     <p:sldId id="302" r:id="rId31"/>
-    <p:sldId id="303" r:id="rId32"/>
-    <p:sldId id="305" r:id="rId33"/>
-    <p:sldId id="304" r:id="rId34"/>
-    <p:sldId id="280" r:id="rId35"/>
-    <p:sldId id="283" r:id="rId36"/>
-    <p:sldId id="281" r:id="rId37"/>
-    <p:sldId id="279" r:id="rId38"/>
-    <p:sldId id="314" r:id="rId39"/>
-    <p:sldId id="299" r:id="rId40"/>
-    <p:sldId id="286" r:id="rId41"/>
+    <p:sldId id="305" r:id="rId32"/>
+    <p:sldId id="304" r:id="rId33"/>
+    <p:sldId id="280" r:id="rId34"/>
+    <p:sldId id="283" r:id="rId35"/>
+    <p:sldId id="281" r:id="rId36"/>
+    <p:sldId id="279" r:id="rId37"/>
+    <p:sldId id="314" r:id="rId38"/>
+    <p:sldId id="299" r:id="rId39"/>
+    <p:sldId id="286" r:id="rId40"/>
   </p:sldIdLst>
   <p:sldSz cx="9144000" cy="6858000" type="screen4x3"/>
-  <p:notesSz cx="7010400" cy="9296400"/>
+  <p:notesSz cx="6881813" cy="9296400"/>
   <p:defaultTextStyle>
     <a:defPPr>
       <a:defRPr lang="en-US"/>
@@ -196,12 +195,12 @@
     </p:ext>
     <p:ext uri="{2D200454-40CA-4A62-9FC3-DE9A4176ACB9}">
       <p15:notesGuideLst xmlns:p15="http://schemas.microsoft.com/office/powerpoint/2012/main">
-        <p15:guide id="1" orient="horz" pos="2928">
+        <p15:guide id="1" orient="horz" pos="2928" userDrawn="1">
           <p15:clr>
             <a:srgbClr val="A4A3A4"/>
           </p15:clr>
         </p15:guide>
-        <p15:guide id="2" pos="2208">
+        <p15:guide id="2" pos="2168" userDrawn="1">
           <p15:clr>
             <a:srgbClr val="A4A3A4"/>
           </p15:clr>
@@ -249,8 +248,8 @@
         </p:nvSpPr>
         <p:spPr bwMode="auto">
           <a:xfrm>
-            <a:off x="3971925" y="0"/>
-            <a:ext cx="3038475" cy="465138"/>
+            <a:off x="3899072" y="0"/>
+            <a:ext cx="2982743" cy="465138"/>
           </a:xfrm>
           <a:prstGeom prst="rect">
             <a:avLst/>
@@ -265,14 +264,14 @@
           <a:effectLst/>
         </p:spPr>
         <p:txBody>
-          <a:bodyPr vert="horz" wrap="square" lIns="93177" tIns="46589" rIns="93177" bIns="46589" numCol="1" anchor="t" anchorCtr="0" compatLnSpc="1">
+          <a:bodyPr vert="horz" wrap="square" lIns="92429" tIns="46215" rIns="92429" bIns="46215" numCol="1" anchor="t" anchorCtr="0" compatLnSpc="1">
             <a:prstTxWarp prst="textNoShape">
               <a:avLst/>
             </a:prstTxWarp>
           </a:bodyPr>
           <a:lstStyle>
-            <a:lvl1pPr algn="r" defTabSz="931863">
-              <a:defRPr sz="1200"/>
+            <a:lvl1pPr algn="r" defTabSz="924380">
+              <a:defRPr sz="1100"/>
             </a:lvl1pPr>
           </a:lstStyle>
           <a:p>
@@ -280,7 +279,7 @@
               <a:defRPr/>
             </a:pPr>
             <a:r>
-              <a:rPr lang="en-US" sz="1100" dirty="0">
+              <a:rPr lang="en-US" dirty="0">
                 <a:latin typeface="+mn-lt"/>
               </a:rPr>
               <a:t>Overview of Compilers</a:t>
@@ -300,8 +299,8 @@
         </p:nvSpPr>
         <p:spPr bwMode="auto">
           <a:xfrm>
-            <a:off x="3971925" y="8831263"/>
-            <a:ext cx="3038475" cy="465137"/>
+            <a:off x="3899072" y="8831264"/>
+            <a:ext cx="2982743" cy="465137"/>
           </a:xfrm>
           <a:prstGeom prst="rect">
             <a:avLst/>
@@ -316,14 +315,14 @@
           <a:effectLst/>
         </p:spPr>
         <p:txBody>
-          <a:bodyPr vert="horz" wrap="square" lIns="93177" tIns="46589" rIns="93177" bIns="46589" numCol="1" anchor="b" anchorCtr="0" compatLnSpc="1">
+          <a:bodyPr vert="horz" wrap="square" lIns="92429" tIns="46215" rIns="92429" bIns="46215" numCol="1" anchor="b" anchorCtr="0" compatLnSpc="1">
             <a:prstTxWarp prst="textNoShape">
               <a:avLst/>
             </a:prstTxWarp>
           </a:bodyPr>
           <a:lstStyle>
-            <a:lvl1pPr algn="r" defTabSz="931863">
-              <a:defRPr sz="1200"/>
+            <a:lvl1pPr algn="r" defTabSz="924380">
+              <a:defRPr sz="1100"/>
             </a:lvl1pPr>
           </a:lstStyle>
           <a:p>
@@ -331,13 +330,13 @@
               <a:defRPr/>
             </a:pPr>
             <a:r>
-              <a:rPr lang="en-US" sz="1100">
+              <a:rPr lang="en-US">
                 <a:latin typeface="+mn-lt"/>
               </a:rPr>
               <a:t>1-</a:t>
             </a:r>
             <a:fld id="{CF1715FB-A982-4256-96DA-A09F3747366A}" type="slidenum">
-              <a:rPr lang="en-US" sz="1100">
+              <a:rPr lang="en-US">
                 <a:latin typeface="+mn-lt"/>
               </a:rPr>
               <a:pPr>
@@ -345,7 +344,7 @@
               </a:pPr>
               <a:t>‹#›</a:t>
             </a:fld>
-            <a:endParaRPr lang="en-US" sz="1100">
+            <a:endParaRPr lang="en-US">
               <a:latin typeface="+mn-lt"/>
             </a:endParaRPr>
           </a:p>
@@ -400,7 +399,7 @@
         <p:spPr bwMode="auto">
           <a:xfrm>
             <a:off x="0" y="0"/>
-            <a:ext cx="3038475" cy="465138"/>
+            <a:ext cx="2982743" cy="465138"/>
           </a:xfrm>
           <a:prstGeom prst="rect">
             <a:avLst/>
@@ -415,14 +414,14 @@
           <a:effectLst/>
         </p:spPr>
         <p:txBody>
-          <a:bodyPr vert="horz" wrap="square" lIns="93177" tIns="46589" rIns="93177" bIns="46589" numCol="1" anchor="t" anchorCtr="0" compatLnSpc="1">
+          <a:bodyPr vert="horz" wrap="square" lIns="92429" tIns="46215" rIns="92429" bIns="46215" numCol="1" anchor="t" anchorCtr="0" compatLnSpc="1">
             <a:prstTxWarp prst="textNoShape">
               <a:avLst/>
             </a:prstTxWarp>
           </a:bodyPr>
           <a:lstStyle>
-            <a:lvl1pPr algn="l" defTabSz="931863">
-              <a:defRPr sz="1200"/>
+            <a:lvl1pPr algn="l" defTabSz="924380">
+              <a:defRPr sz="1100"/>
             </a:lvl1pPr>
           </a:lstStyle>
           <a:p>
@@ -448,8 +447,8 @@
         </p:nvSpPr>
         <p:spPr bwMode="auto">
           <a:xfrm>
-            <a:off x="3971925" y="0"/>
-            <a:ext cx="3038475" cy="465138"/>
+            <a:off x="3899072" y="0"/>
+            <a:ext cx="2982743" cy="465138"/>
           </a:xfrm>
           <a:prstGeom prst="rect">
             <a:avLst/>
@@ -464,14 +463,14 @@
           <a:effectLst/>
         </p:spPr>
         <p:txBody>
-          <a:bodyPr vert="horz" wrap="square" lIns="93177" tIns="46589" rIns="93177" bIns="46589" numCol="1" anchor="t" anchorCtr="0" compatLnSpc="1">
+          <a:bodyPr vert="horz" wrap="square" lIns="92429" tIns="46215" rIns="92429" bIns="46215" numCol="1" anchor="t" anchorCtr="0" compatLnSpc="1">
             <a:prstTxWarp prst="textNoShape">
               <a:avLst/>
             </a:prstTxWarp>
           </a:bodyPr>
           <a:lstStyle>
-            <a:lvl1pPr algn="r" defTabSz="931863">
-              <a:defRPr sz="1200"/>
+            <a:lvl1pPr algn="r" defTabSz="924380">
+              <a:defRPr sz="1100"/>
             </a:lvl1pPr>
           </a:lstStyle>
           <a:p>
@@ -494,8 +493,8 @@
         </p:nvSpPr>
         <p:spPr bwMode="auto">
           <a:xfrm>
-            <a:off x="1181100" y="696913"/>
-            <a:ext cx="4648200" cy="3486150"/>
+            <a:off x="1117600" y="696913"/>
+            <a:ext cx="4646613" cy="3486150"/>
           </a:xfrm>
           <a:prstGeom prst="rect">
             <a:avLst/>
@@ -523,8 +522,8 @@
         </p:nvSpPr>
         <p:spPr bwMode="auto">
           <a:xfrm>
-            <a:off x="935038" y="4416425"/>
-            <a:ext cx="5140325" cy="4183063"/>
+            <a:off x="917889" y="4416426"/>
+            <a:ext cx="5046039" cy="4183063"/>
           </a:xfrm>
           <a:prstGeom prst="rect">
             <a:avLst/>
@@ -539,7 +538,7 @@
           <a:effectLst/>
         </p:spPr>
         <p:txBody>
-          <a:bodyPr vert="horz" wrap="square" lIns="93177" tIns="46589" rIns="93177" bIns="46589" numCol="1" anchor="t" anchorCtr="0" compatLnSpc="1">
+          <a:bodyPr vert="horz" wrap="square" lIns="92429" tIns="46215" rIns="92429" bIns="46215" numCol="1" anchor="t" anchorCtr="0" compatLnSpc="1">
             <a:prstTxWarp prst="textNoShape">
               <a:avLst/>
             </a:prstTxWarp>
@@ -594,8 +593,8 @@
         </p:nvSpPr>
         <p:spPr bwMode="auto">
           <a:xfrm>
-            <a:off x="0" y="8831263"/>
-            <a:ext cx="3038475" cy="465137"/>
+            <a:off x="0" y="8831264"/>
+            <a:ext cx="2982743" cy="465137"/>
           </a:xfrm>
           <a:prstGeom prst="rect">
             <a:avLst/>
@@ -610,14 +609,14 @@
           <a:effectLst/>
         </p:spPr>
         <p:txBody>
-          <a:bodyPr vert="horz" wrap="square" lIns="93177" tIns="46589" rIns="93177" bIns="46589" numCol="1" anchor="b" anchorCtr="0" compatLnSpc="1">
+          <a:bodyPr vert="horz" wrap="square" lIns="92429" tIns="46215" rIns="92429" bIns="46215" numCol="1" anchor="b" anchorCtr="0" compatLnSpc="1">
             <a:prstTxWarp prst="textNoShape">
               <a:avLst/>
             </a:prstTxWarp>
           </a:bodyPr>
           <a:lstStyle>
-            <a:lvl1pPr algn="l" defTabSz="931863">
-              <a:defRPr sz="1200"/>
+            <a:lvl1pPr algn="l" defTabSz="924380">
+              <a:defRPr sz="1100"/>
             </a:lvl1pPr>
           </a:lstStyle>
           <a:p>
@@ -640,8 +639,8 @@
         </p:nvSpPr>
         <p:spPr bwMode="auto">
           <a:xfrm>
-            <a:off x="3971925" y="8831263"/>
-            <a:ext cx="3038475" cy="465137"/>
+            <a:off x="3899072" y="8831264"/>
+            <a:ext cx="2982743" cy="465137"/>
           </a:xfrm>
           <a:prstGeom prst="rect">
             <a:avLst/>
@@ -656,14 +655,14 @@
           <a:effectLst/>
         </p:spPr>
         <p:txBody>
-          <a:bodyPr vert="horz" wrap="square" lIns="93177" tIns="46589" rIns="93177" bIns="46589" numCol="1" anchor="b" anchorCtr="0" compatLnSpc="1">
+          <a:bodyPr vert="horz" wrap="square" lIns="92429" tIns="46215" rIns="92429" bIns="46215" numCol="1" anchor="b" anchorCtr="0" compatLnSpc="1">
             <a:prstTxWarp prst="textNoShape">
               <a:avLst/>
             </a:prstTxWarp>
           </a:bodyPr>
           <a:lstStyle>
-            <a:lvl1pPr algn="r" defTabSz="931863">
-              <a:defRPr sz="1200"/>
+            <a:lvl1pPr algn="r" defTabSz="924380">
+              <a:defRPr sz="1100"/>
             </a:lvl1pPr>
           </a:lstStyle>
           <a:p>
@@ -3503,122 +3502,6 @@
       </p:grpSpPr>
       <p:sp>
         <p:nvSpPr>
-          <p:cNvPr id="70658" name="Slide Image Placeholder 1"/>
-          <p:cNvSpPr>
-            <a:spLocks noGrp="1" noRot="1" noChangeAspect="1" noTextEdit="1"/>
-          </p:cNvSpPr>
-          <p:nvPr>
-            <p:ph type="sldImg"/>
-          </p:nvPr>
-        </p:nvSpPr>
-        <p:spPr>
-          <a:ln/>
-        </p:spPr>
-      </p:sp>
-      <p:sp>
-        <p:nvSpPr>
-          <p:cNvPr id="70659" name="Notes Placeholder 2"/>
-          <p:cNvSpPr>
-            <a:spLocks noGrp="1"/>
-          </p:cNvSpPr>
-          <p:nvPr>
-            <p:ph type="body" idx="1"/>
-          </p:nvPr>
-        </p:nvSpPr>
-        <p:spPr>
-          <a:noFill/>
-          <a:ln/>
-        </p:spPr>
-        <p:txBody>
-          <a:bodyPr/>
-          <a:lstStyle/>
-          <a:p>
-            <a:endParaRPr lang="en-US"/>
-          </a:p>
-        </p:txBody>
-      </p:sp>
-      <p:sp>
-        <p:nvSpPr>
-          <p:cNvPr id="70660" name="Header Placeholder 3"/>
-          <p:cNvSpPr>
-            <a:spLocks noGrp="1"/>
-          </p:cNvSpPr>
-          <p:nvPr>
-            <p:ph type="hdr" sz="quarter"/>
-          </p:nvPr>
-        </p:nvSpPr>
-        <p:spPr>
-          <a:noFill/>
-        </p:spPr>
-        <p:txBody>
-          <a:bodyPr/>
-          <a:lstStyle/>
-          <a:p>
-            <a:r>
-              <a:rPr lang="en-US"/>
-              <a:t>Overview</a:t>
-            </a:r>
-          </a:p>
-        </p:txBody>
-      </p:sp>
-      <p:sp>
-        <p:nvSpPr>
-          <p:cNvPr id="70661" name="Slide Number Placeholder 4"/>
-          <p:cNvSpPr>
-            <a:spLocks noGrp="1"/>
-          </p:cNvSpPr>
-          <p:nvPr>
-            <p:ph type="sldNum" sz="quarter" idx="5"/>
-          </p:nvPr>
-        </p:nvSpPr>
-        <p:spPr>
-          <a:noFill/>
-        </p:spPr>
-        <p:txBody>
-          <a:bodyPr/>
-          <a:lstStyle/>
-          <a:p>
-            <a:fld id="{C18841B5-4CBF-465F-9059-0FA29D3D7607}" type="slidenum">
-              <a:rPr lang="en-US" smtClean="0"/>
-              <a:pPr/>
-              <a:t>31</a:t>
-            </a:fld>
-            <a:endParaRPr lang="en-US"/>
-          </a:p>
-        </p:txBody>
-      </p:sp>
-    </p:spTree>
-    <p:extLst>
-      <p:ext uri="{BB962C8B-B14F-4D97-AF65-F5344CB8AC3E}">
-        <p14:creationId xmlns:p14="http://schemas.microsoft.com/office/powerpoint/2010/main" val="2894514420"/>
-      </p:ext>
-    </p:extLst>
-  </p:cSld>
-  <p:clrMapOvr>
-    <a:masterClrMapping/>
-  </p:clrMapOvr>
-</p:notes>
-</file>
-
-<file path=ppt/notesSlides/notesSlide31.xml><?xml version="1.0" encoding="utf-8"?>
-<p:notes xmlns:a="http://schemas.openxmlformats.org/drawingml/2006/main" xmlns:r="http://schemas.openxmlformats.org/officeDocument/2006/relationships" xmlns:p="http://schemas.openxmlformats.org/presentationml/2006/main">
-  <p:cSld>
-    <p:spTree>
-      <p:nvGrpSpPr>
-        <p:cNvPr id="1" name=""/>
-        <p:cNvGrpSpPr/>
-        <p:nvPr/>
-      </p:nvGrpSpPr>
-      <p:grpSpPr>
-        <a:xfrm>
-          <a:off x="0" y="0"/>
-          <a:ext cx="0" cy="0"/>
-          <a:chOff x="0" y="0"/>
-          <a:chExt cx="0" cy="0"/>
-        </a:xfrm>
-      </p:grpSpPr>
-      <p:sp>
-        <p:nvSpPr>
           <p:cNvPr id="71682" name="Slide Image Placeholder 1"/>
           <p:cNvSpPr>
             <a:spLocks noGrp="1" noRot="1" noChangeAspect="1" noTextEdit="1"/>
@@ -3697,7 +3580,7 @@
             <a:fld id="{354A762B-23FC-4D9C-9319-E32DE86B7413}" type="slidenum">
               <a:rPr lang="en-US" smtClean="0"/>
               <a:pPr/>
-              <a:t>32</a:t>
+              <a:t>31</a:t>
             </a:fld>
             <a:endParaRPr lang="en-US"/>
           </a:p>
@@ -3716,7 +3599,7 @@
 </p:notes>
 </file>
 
-<file path=ppt/notesSlides/notesSlide32.xml><?xml version="1.0" encoding="utf-8"?>
+<file path=ppt/notesSlides/notesSlide31.xml><?xml version="1.0" encoding="utf-8"?>
 <p:notes xmlns:a="http://schemas.openxmlformats.org/drawingml/2006/main" xmlns:r="http://schemas.openxmlformats.org/officeDocument/2006/relationships" xmlns:p="http://schemas.openxmlformats.org/presentationml/2006/main">
   <p:cSld>
     <p:spTree>
@@ -3813,7 +3696,7 @@
             <a:fld id="{09D79773-CB6F-4D89-AF3C-07F6CE881356}" type="slidenum">
               <a:rPr lang="en-US" smtClean="0"/>
               <a:pPr/>
-              <a:t>33</a:t>
+              <a:t>32</a:t>
             </a:fld>
             <a:endParaRPr lang="en-US"/>
           </a:p>
@@ -3832,7 +3715,7 @@
 </p:notes>
 </file>
 
-<file path=ppt/notesSlides/notesSlide33.xml><?xml version="1.0" encoding="utf-8"?>
+<file path=ppt/notesSlides/notesSlide32.xml><?xml version="1.0" encoding="utf-8"?>
 <p:notes xmlns:a="http://schemas.openxmlformats.org/drawingml/2006/main" xmlns:r="http://schemas.openxmlformats.org/officeDocument/2006/relationships" xmlns:p="http://schemas.openxmlformats.org/presentationml/2006/main">
   <p:cSld>
     <p:spTree>
@@ -3929,7 +3812,7 @@
             <a:fld id="{1F1285EA-4A9D-4B15-B096-1494399431D9}" type="slidenum">
               <a:rPr lang="en-US" smtClean="0"/>
               <a:pPr/>
-              <a:t>34</a:t>
+              <a:t>33</a:t>
             </a:fld>
             <a:endParaRPr lang="en-US"/>
           </a:p>
@@ -3948,7 +3831,7 @@
 </p:notes>
 </file>
 
-<file path=ppt/notesSlides/notesSlide34.xml><?xml version="1.0" encoding="utf-8"?>
+<file path=ppt/notesSlides/notesSlide33.xml><?xml version="1.0" encoding="utf-8"?>
 <p:notes xmlns:a="http://schemas.openxmlformats.org/drawingml/2006/main" xmlns:r="http://schemas.openxmlformats.org/officeDocument/2006/relationships" xmlns:p="http://schemas.openxmlformats.org/presentationml/2006/main">
   <p:cSld>
     <p:spTree>
@@ -4045,7 +3928,7 @@
             <a:fld id="{F0F645E5-B9F7-4648-B3AC-98A592BFCAD0}" type="slidenum">
               <a:rPr lang="en-US" smtClean="0"/>
               <a:pPr/>
-              <a:t>35</a:t>
+              <a:t>34</a:t>
             </a:fld>
             <a:endParaRPr lang="en-US"/>
           </a:p>
@@ -4064,7 +3947,7 @@
 </p:notes>
 </file>
 
-<file path=ppt/notesSlides/notesSlide35.xml><?xml version="1.0" encoding="utf-8"?>
+<file path=ppt/notesSlides/notesSlide34.xml><?xml version="1.0" encoding="utf-8"?>
 <p:notes xmlns:a="http://schemas.openxmlformats.org/drawingml/2006/main" xmlns:r="http://schemas.openxmlformats.org/officeDocument/2006/relationships" xmlns:p="http://schemas.openxmlformats.org/presentationml/2006/main">
   <p:cSld>
     <p:spTree>
@@ -4161,7 +4044,7 @@
             <a:fld id="{40F15E97-BBB5-46F5-8553-0D64B963256E}" type="slidenum">
               <a:rPr lang="en-US" smtClean="0"/>
               <a:pPr/>
-              <a:t>36</a:t>
+              <a:t>35</a:t>
             </a:fld>
             <a:endParaRPr lang="en-US"/>
           </a:p>
@@ -4171,6 +4054,122 @@
     <p:extLst>
       <p:ext uri="{BB962C8B-B14F-4D97-AF65-F5344CB8AC3E}">
         <p14:creationId xmlns:p14="http://schemas.microsoft.com/office/powerpoint/2010/main" val="3194553735"/>
+      </p:ext>
+    </p:extLst>
+  </p:cSld>
+  <p:clrMapOvr>
+    <a:masterClrMapping/>
+  </p:clrMapOvr>
+</p:notes>
+</file>
+
+<file path=ppt/notesSlides/notesSlide35.xml><?xml version="1.0" encoding="utf-8"?>
+<p:notes xmlns:a="http://schemas.openxmlformats.org/drawingml/2006/main" xmlns:r="http://schemas.openxmlformats.org/officeDocument/2006/relationships" xmlns:p="http://schemas.openxmlformats.org/presentationml/2006/main">
+  <p:cSld>
+    <p:spTree>
+      <p:nvGrpSpPr>
+        <p:cNvPr id="1" name=""/>
+        <p:cNvGrpSpPr/>
+        <p:nvPr/>
+      </p:nvGrpSpPr>
+      <p:grpSpPr>
+        <a:xfrm>
+          <a:off x="0" y="0"/>
+          <a:ext cx="0" cy="0"/>
+          <a:chOff x="0" y="0"/>
+          <a:chExt cx="0" cy="0"/>
+        </a:xfrm>
+      </p:grpSpPr>
+      <p:sp>
+        <p:nvSpPr>
+          <p:cNvPr id="76802" name="Slide Image Placeholder 1"/>
+          <p:cNvSpPr>
+            <a:spLocks noGrp="1" noRot="1" noChangeAspect="1" noTextEdit="1"/>
+          </p:cNvSpPr>
+          <p:nvPr>
+            <p:ph type="sldImg"/>
+          </p:nvPr>
+        </p:nvSpPr>
+        <p:spPr>
+          <a:ln/>
+        </p:spPr>
+      </p:sp>
+      <p:sp>
+        <p:nvSpPr>
+          <p:cNvPr id="76803" name="Notes Placeholder 2"/>
+          <p:cNvSpPr>
+            <a:spLocks noGrp="1"/>
+          </p:cNvSpPr>
+          <p:nvPr>
+            <p:ph type="body" idx="1"/>
+          </p:nvPr>
+        </p:nvSpPr>
+        <p:spPr>
+          <a:noFill/>
+          <a:ln/>
+        </p:spPr>
+        <p:txBody>
+          <a:bodyPr/>
+          <a:lstStyle/>
+          <a:p>
+            <a:endParaRPr lang="en-US"/>
+          </a:p>
+        </p:txBody>
+      </p:sp>
+      <p:sp>
+        <p:nvSpPr>
+          <p:cNvPr id="76804" name="Header Placeholder 3"/>
+          <p:cNvSpPr>
+            <a:spLocks noGrp="1"/>
+          </p:cNvSpPr>
+          <p:nvPr>
+            <p:ph type="hdr" sz="quarter"/>
+          </p:nvPr>
+        </p:nvSpPr>
+        <p:spPr>
+          <a:noFill/>
+        </p:spPr>
+        <p:txBody>
+          <a:bodyPr/>
+          <a:lstStyle/>
+          <a:p>
+            <a:r>
+              <a:rPr lang="en-US"/>
+              <a:t>Overview</a:t>
+            </a:r>
+          </a:p>
+        </p:txBody>
+      </p:sp>
+      <p:sp>
+        <p:nvSpPr>
+          <p:cNvPr id="76805" name="Slide Number Placeholder 4"/>
+          <p:cNvSpPr>
+            <a:spLocks noGrp="1"/>
+          </p:cNvSpPr>
+          <p:nvPr>
+            <p:ph type="sldNum" sz="quarter" idx="5"/>
+          </p:nvPr>
+        </p:nvSpPr>
+        <p:spPr>
+          <a:noFill/>
+        </p:spPr>
+        <p:txBody>
+          <a:bodyPr/>
+          <a:lstStyle/>
+          <a:p>
+            <a:fld id="{1CD4857E-C895-4437-BF03-1B106071D256}" type="slidenum">
+              <a:rPr lang="en-US" smtClean="0"/>
+              <a:pPr/>
+              <a:t>36</a:t>
+            </a:fld>
+            <a:endParaRPr lang="en-US"/>
+          </a:p>
+        </p:txBody>
+      </p:sp>
+    </p:spTree>
+    <p:extLst>
+      <p:ext uri="{BB962C8B-B14F-4D97-AF65-F5344CB8AC3E}">
+        <p14:creationId xmlns:p14="http://schemas.microsoft.com/office/powerpoint/2010/main" val="2095944674"/>
       </p:ext>
     </p:extLst>
   </p:cSld>
@@ -4286,7 +4285,7 @@
     </p:spTree>
     <p:extLst>
       <p:ext uri="{BB962C8B-B14F-4D97-AF65-F5344CB8AC3E}">
-        <p14:creationId xmlns:p14="http://schemas.microsoft.com/office/powerpoint/2010/main" val="2095944674"/>
+        <p14:creationId xmlns:p14="http://schemas.microsoft.com/office/powerpoint/2010/main" val="1958639721"/>
       </p:ext>
     </p:extLst>
   </p:cSld>
@@ -4297,122 +4296,6 @@
 </file>
 
 <file path=ppt/notesSlides/notesSlide37.xml><?xml version="1.0" encoding="utf-8"?>
-<p:notes xmlns:a="http://schemas.openxmlformats.org/drawingml/2006/main" xmlns:r="http://schemas.openxmlformats.org/officeDocument/2006/relationships" xmlns:p="http://schemas.openxmlformats.org/presentationml/2006/main">
-  <p:cSld>
-    <p:spTree>
-      <p:nvGrpSpPr>
-        <p:cNvPr id="1" name=""/>
-        <p:cNvGrpSpPr/>
-        <p:nvPr/>
-      </p:nvGrpSpPr>
-      <p:grpSpPr>
-        <a:xfrm>
-          <a:off x="0" y="0"/>
-          <a:ext cx="0" cy="0"/>
-          <a:chOff x="0" y="0"/>
-          <a:chExt cx="0" cy="0"/>
-        </a:xfrm>
-      </p:grpSpPr>
-      <p:sp>
-        <p:nvSpPr>
-          <p:cNvPr id="76802" name="Slide Image Placeholder 1"/>
-          <p:cNvSpPr>
-            <a:spLocks noGrp="1" noRot="1" noChangeAspect="1" noTextEdit="1"/>
-          </p:cNvSpPr>
-          <p:nvPr>
-            <p:ph type="sldImg"/>
-          </p:nvPr>
-        </p:nvSpPr>
-        <p:spPr>
-          <a:ln/>
-        </p:spPr>
-      </p:sp>
-      <p:sp>
-        <p:nvSpPr>
-          <p:cNvPr id="76803" name="Notes Placeholder 2"/>
-          <p:cNvSpPr>
-            <a:spLocks noGrp="1"/>
-          </p:cNvSpPr>
-          <p:nvPr>
-            <p:ph type="body" idx="1"/>
-          </p:nvPr>
-        </p:nvSpPr>
-        <p:spPr>
-          <a:noFill/>
-          <a:ln/>
-        </p:spPr>
-        <p:txBody>
-          <a:bodyPr/>
-          <a:lstStyle/>
-          <a:p>
-            <a:endParaRPr lang="en-US"/>
-          </a:p>
-        </p:txBody>
-      </p:sp>
-      <p:sp>
-        <p:nvSpPr>
-          <p:cNvPr id="76804" name="Header Placeholder 3"/>
-          <p:cNvSpPr>
-            <a:spLocks noGrp="1"/>
-          </p:cNvSpPr>
-          <p:nvPr>
-            <p:ph type="hdr" sz="quarter"/>
-          </p:nvPr>
-        </p:nvSpPr>
-        <p:spPr>
-          <a:noFill/>
-        </p:spPr>
-        <p:txBody>
-          <a:bodyPr/>
-          <a:lstStyle/>
-          <a:p>
-            <a:r>
-              <a:rPr lang="en-US"/>
-              <a:t>Overview</a:t>
-            </a:r>
-          </a:p>
-        </p:txBody>
-      </p:sp>
-      <p:sp>
-        <p:nvSpPr>
-          <p:cNvPr id="76805" name="Slide Number Placeholder 4"/>
-          <p:cNvSpPr>
-            <a:spLocks noGrp="1"/>
-          </p:cNvSpPr>
-          <p:nvPr>
-            <p:ph type="sldNum" sz="quarter" idx="5"/>
-          </p:nvPr>
-        </p:nvSpPr>
-        <p:spPr>
-          <a:noFill/>
-        </p:spPr>
-        <p:txBody>
-          <a:bodyPr/>
-          <a:lstStyle/>
-          <a:p>
-            <a:fld id="{1CD4857E-C895-4437-BF03-1B106071D256}" type="slidenum">
-              <a:rPr lang="en-US" smtClean="0"/>
-              <a:pPr/>
-              <a:t>38</a:t>
-            </a:fld>
-            <a:endParaRPr lang="en-US"/>
-          </a:p>
-        </p:txBody>
-      </p:sp>
-    </p:spTree>
-    <p:extLst>
-      <p:ext uri="{BB962C8B-B14F-4D97-AF65-F5344CB8AC3E}">
-        <p14:creationId xmlns:p14="http://schemas.microsoft.com/office/powerpoint/2010/main" val="1958639721"/>
-      </p:ext>
-    </p:extLst>
-  </p:cSld>
-  <p:clrMapOvr>
-    <a:masterClrMapping/>
-  </p:clrMapOvr>
-</p:notes>
-</file>
-
-<file path=ppt/notesSlides/notesSlide38.xml><?xml version="1.0" encoding="utf-8"?>
 <p:notes xmlns:a="http://schemas.openxmlformats.org/drawingml/2006/main" xmlns:r="http://schemas.openxmlformats.org/officeDocument/2006/relationships" xmlns:p="http://schemas.openxmlformats.org/presentationml/2006/main">
   <p:cSld>
     <p:spTree>
@@ -4509,7 +4392,7 @@
             <a:fld id="{891F7CF7-5ECF-4AF8-8F03-7616AB30EBD0}" type="slidenum">
               <a:rPr lang="en-US" smtClean="0"/>
               <a:pPr/>
-              <a:t>39</a:t>
+              <a:t>38</a:t>
             </a:fld>
             <a:endParaRPr lang="en-US"/>
           </a:p>
@@ -4528,7 +4411,7 @@
 </p:notes>
 </file>
 
-<file path=ppt/notesSlides/notesSlide39.xml><?xml version="1.0" encoding="utf-8"?>
+<file path=ppt/notesSlides/notesSlide38.xml><?xml version="1.0" encoding="utf-8"?>
 <p:notes xmlns:a="http://schemas.openxmlformats.org/drawingml/2006/main" xmlns:r="http://schemas.openxmlformats.org/officeDocument/2006/relationships" xmlns:p="http://schemas.openxmlformats.org/presentationml/2006/main">
   <p:cSld>
     <p:spTree>
@@ -4625,7 +4508,7 @@
             <a:fld id="{9B0ACD02-6F40-4E73-B8A6-AB01A613B27D}" type="slidenum">
               <a:rPr lang="en-US" smtClean="0"/>
               <a:pPr/>
-              <a:t>40</a:t>
+              <a:t>39</a:t>
             </a:fld>
             <a:endParaRPr lang="en-US"/>
           </a:p>
@@ -25881,7 +25764,7 @@
         </p:nvGrpSpPr>
         <p:grpSpPr>
           <a:xfrm>
-            <a:off x="1474209" y="3200400"/>
+            <a:off x="1584621" y="3048000"/>
             <a:ext cx="5974758" cy="2305752"/>
             <a:chOff x="1474209" y="3200400"/>
             <a:chExt cx="5974758" cy="2305752"/>
@@ -27871,17 +27754,7 @@
           <a:p>
             <a:r>
               <a:rPr lang="en-US" dirty="0"/>
-              <a:t>Write another compiler for C#/</a:t>
-            </a:r>
-            <a:r>
-              <a:rPr lang="en-US" dirty="0">
-                <a:latin typeface="Consolas" panose="020B0609020204030204" pitchFamily="49" charset="0"/>
-              </a:rPr>
-              <a:t>0</a:t>
-            </a:r>
-            <a:r>
-              <a:rPr lang="en-US" dirty="0"/>
-              <a:t> in the language C#/</a:t>
+              <a:t>Write the full compiler for C# in C#/</a:t>
             </a:r>
             <a:r>
               <a:rPr lang="en-US" dirty="0">
@@ -27897,14 +27770,7 @@
           <a:p>
             <a:r>
               <a:rPr lang="en-US" dirty="0"/>
-              <a:t>Compile it using the compiler obtained from step 1.</a:t>
-            </a:r>
-            <a:br>
-              <a:rPr lang="en-US" dirty="0"/>
-            </a:br>
-            <a:r>
-              <a:rPr lang="en-US" dirty="0"/>
-              <a:t>(At this point we no longer need the C compiler.)</a:t>
+              <a:t>Compile it using the compiler obtained from step 1</a:t>
             </a:r>
           </a:p>
         </p:txBody>
@@ -27917,7 +27783,7 @@
         </p:nvGrpSpPr>
         <p:grpSpPr>
           <a:xfrm>
-            <a:off x="1474209" y="3067050"/>
+            <a:off x="1584621" y="2667000"/>
             <a:ext cx="5974758" cy="2705405"/>
             <a:chOff x="1474209" y="3067050"/>
             <a:chExt cx="5974758" cy="2705405"/>
@@ -28281,8 +28147,8 @@
             </p:nvSpPr>
             <p:spPr bwMode="auto">
               <a:xfrm>
-                <a:off x="755" y="2557"/>
-                <a:ext cx="659" cy="204"/>
+                <a:off x="805" y="2557"/>
+                <a:ext cx="559" cy="204"/>
               </a:xfrm>
               <a:prstGeom prst="rect">
                 <a:avLst/>
@@ -28303,17 +28169,7 @@
               <a:p>
                 <a:r>
                   <a:rPr lang="en-US" sz="1500" dirty="0"/>
-                  <a:t>C#/</a:t>
-                </a:r>
-                <a:r>
-                  <a:rPr lang="en-US" sz="1500" dirty="0">
-                    <a:latin typeface="Consolas" panose="020B0609020204030204" pitchFamily="49" charset="0"/>
-                  </a:rPr>
-                  <a:t>0</a:t>
-                </a:r>
-                <a:r>
-                  <a:rPr lang="en-US" sz="1500" dirty="0"/>
-                  <a:t> </a:t>
+                  <a:t>C# </a:t>
                 </a:r>
                 <a:r>
                   <a:rPr lang="en-US" sz="1500" dirty="0">
@@ -29073,8 +28929,8 @@
             </p:nvSpPr>
             <p:spPr bwMode="auto">
               <a:xfrm>
-                <a:off x="755" y="2557"/>
-                <a:ext cx="659" cy="204"/>
+                <a:off x="805" y="2557"/>
+                <a:ext cx="559" cy="204"/>
               </a:xfrm>
               <a:prstGeom prst="rect">
                 <a:avLst/>
@@ -29095,17 +28951,7 @@
               <a:p>
                 <a:r>
                   <a:rPr lang="en-US" sz="1500" dirty="0"/>
-                  <a:t>C#/</a:t>
-                </a:r>
-                <a:r>
-                  <a:rPr lang="en-US" sz="1500" dirty="0">
-                    <a:latin typeface="Consolas" panose="020B0609020204030204" pitchFamily="49" charset="0"/>
-                  </a:rPr>
-                  <a:t>0</a:t>
-                </a:r>
-                <a:r>
-                  <a:rPr lang="en-US" sz="1500" dirty="0"/>
-                  <a:t> </a:t>
+                  <a:t>C# </a:t>
                 </a:r>
                 <a:r>
                   <a:rPr lang="en-US" sz="1500" dirty="0">
@@ -29487,1688 +29333,6 @@
       </p:grpSpPr>
       <p:sp>
         <p:nvSpPr>
-          <p:cNvPr id="31746" name="Footer Placeholder 3"/>
-          <p:cNvSpPr>
-            <a:spLocks noGrp="1"/>
-          </p:cNvSpPr>
-          <p:nvPr>
-            <p:ph type="ftr" sz="quarter" idx="10"/>
-          </p:nvPr>
-        </p:nvSpPr>
-        <p:spPr>
-          <a:noFill/>
-        </p:spPr>
-        <p:txBody>
-          <a:bodyPr/>
-          <a:lstStyle/>
-          <a:p>
-            <a:r>
-              <a:rPr lang="en-US"/>
-              <a:t>©SoftMoore Consulting</a:t>
-            </a:r>
-          </a:p>
-        </p:txBody>
-      </p:sp>
-      <p:sp>
-        <p:nvSpPr>
-          <p:cNvPr id="31747" name="Slide Number Placeholder 4"/>
-          <p:cNvSpPr>
-            <a:spLocks noGrp="1"/>
-          </p:cNvSpPr>
-          <p:nvPr>
-            <p:ph type="sldNum" sz="quarter" idx="11"/>
-          </p:nvPr>
-        </p:nvSpPr>
-        <p:spPr>
-          <a:noFill/>
-        </p:spPr>
-        <p:txBody>
-          <a:bodyPr/>
-          <a:lstStyle/>
-          <a:p>
-            <a:r>
-              <a:rPr lang="en-US"/>
-              <a:t>Slide </a:t>
-            </a:r>
-            <a:fld id="{682BC4F9-C1FD-4BB9-9A3B-8B2B231F18EC}" type="slidenum">
-              <a:rPr lang="en-US" smtClean="0"/>
-              <a:pPr/>
-              <a:t>31</a:t>
-            </a:fld>
-            <a:endParaRPr lang="en-US"/>
-          </a:p>
-        </p:txBody>
-      </p:sp>
-      <p:sp>
-        <p:nvSpPr>
-          <p:cNvPr id="31748" name="Rectangle 2"/>
-          <p:cNvSpPr>
-            <a:spLocks noGrp="1" noChangeArrowheads="1"/>
-          </p:cNvSpPr>
-          <p:nvPr>
-            <p:ph type="title"/>
-          </p:nvPr>
-        </p:nvSpPr>
-        <p:spPr/>
-        <p:txBody>
-          <a:bodyPr/>
-          <a:lstStyle/>
-          <a:p>
-            <a:r>
-              <a:rPr lang="en-US" dirty="0"/>
-              <a:t>Bootstrapping a Compiler: Step 3</a:t>
-            </a:r>
-          </a:p>
-        </p:txBody>
-      </p:sp>
-      <p:sp>
-        <p:nvSpPr>
-          <p:cNvPr id="31749" name="Rectangle 3"/>
-          <p:cNvSpPr>
-            <a:spLocks noGrp="1" noChangeArrowheads="1"/>
-          </p:cNvSpPr>
-          <p:nvPr>
-            <p:ph type="body" idx="1"/>
-          </p:nvPr>
-        </p:nvSpPr>
-        <p:spPr/>
-        <p:txBody>
-          <a:bodyPr/>
-          <a:lstStyle/>
-          <a:p>
-            <a:r>
-              <a:rPr lang="en-US" dirty="0"/>
-              <a:t>Write the full compiler for C# in C#/</a:t>
-            </a:r>
-            <a:r>
-              <a:rPr lang="en-US" dirty="0">
-                <a:latin typeface="Consolas" panose="020B0609020204030204" pitchFamily="49" charset="0"/>
-              </a:rPr>
-              <a:t>0</a:t>
-            </a:r>
-            <a:r>
-              <a:rPr lang="en-US" dirty="0"/>
-              <a:t>.</a:t>
-            </a:r>
-          </a:p>
-          <a:p>
-            <a:r>
-              <a:rPr lang="en-US" dirty="0"/>
-              <a:t>Compile it using the compiler obtained from step 2.</a:t>
-            </a:r>
-          </a:p>
-        </p:txBody>
-      </p:sp>
-      <p:grpSp>
-        <p:nvGrpSpPr>
-          <p:cNvPr id="4" name="Group 3">
-            <a:extLst>
-              <a:ext uri="{FF2B5EF4-FFF2-40B4-BE49-F238E27FC236}">
-                <a16:creationId xmlns:a16="http://schemas.microsoft.com/office/drawing/2014/main" id="{FC27BC0C-657B-4E67-9E54-AC081B981532}"/>
-              </a:ext>
-            </a:extLst>
-          </p:cNvPr>
-          <p:cNvGrpSpPr/>
-          <p:nvPr/>
-        </p:nvGrpSpPr>
-        <p:grpSpPr>
-          <a:xfrm>
-            <a:off x="1584621" y="2743200"/>
-            <a:ext cx="5974758" cy="2616505"/>
-            <a:chOff x="1474209" y="2971800"/>
-            <a:chExt cx="5974758" cy="2616505"/>
-          </a:xfrm>
-        </p:grpSpPr>
-        <p:grpSp>
-          <p:nvGrpSpPr>
-            <p:cNvPr id="31750" name="Group 4"/>
-            <p:cNvGrpSpPr>
-              <a:grpSpLocks/>
-            </p:cNvGrpSpPr>
-            <p:nvPr/>
-          </p:nvGrpSpPr>
-          <p:grpSpPr bwMode="auto">
-            <a:xfrm>
-              <a:off x="2667000" y="2971800"/>
-              <a:ext cx="1462088" cy="730250"/>
-              <a:chOff x="624" y="2544"/>
-              <a:chExt cx="921" cy="460"/>
-            </a:xfrm>
-          </p:grpSpPr>
-          <p:grpSp>
-            <p:nvGrpSpPr>
-              <p:cNvPr id="31784" name="Group 5"/>
-              <p:cNvGrpSpPr>
-                <a:grpSpLocks/>
-              </p:cNvGrpSpPr>
-              <p:nvPr/>
-            </p:nvGrpSpPr>
-            <p:grpSpPr bwMode="auto">
-              <a:xfrm>
-                <a:off x="624" y="2544"/>
-                <a:ext cx="921" cy="460"/>
-                <a:chOff x="624" y="2544"/>
-                <a:chExt cx="921" cy="460"/>
-              </a:xfrm>
-            </p:grpSpPr>
-            <p:sp>
-              <p:nvSpPr>
-                <p:cNvPr id="31787" name="Line 6"/>
-                <p:cNvSpPr>
-                  <a:spLocks noChangeShapeType="1"/>
-                </p:cNvSpPr>
-                <p:nvPr/>
-              </p:nvSpPr>
-              <p:spPr bwMode="auto">
-                <a:xfrm>
-                  <a:off x="624" y="2544"/>
-                  <a:ext cx="921" cy="0"/>
-                </a:xfrm>
-                <a:prstGeom prst="line">
-                  <a:avLst/>
-                </a:prstGeom>
-                <a:noFill/>
-                <a:ln w="9525">
-                  <a:solidFill>
-                    <a:schemeClr val="tx1"/>
-                  </a:solidFill>
-                  <a:round/>
-                  <a:headEnd/>
-                  <a:tailEnd/>
-                </a:ln>
-              </p:spPr>
-              <p:txBody>
-                <a:bodyPr wrap="none" lIns="92075" tIns="46038" rIns="92075" bIns="46038" anchor="ctr"/>
-                <a:lstStyle/>
-                <a:p>
-                  <a:endParaRPr lang="en-US"/>
-                </a:p>
-              </p:txBody>
-            </p:sp>
-            <p:sp>
-              <p:nvSpPr>
-                <p:cNvPr id="31788" name="Line 7"/>
-                <p:cNvSpPr>
-                  <a:spLocks noChangeShapeType="1"/>
-                </p:cNvSpPr>
-                <p:nvPr/>
-              </p:nvSpPr>
-              <p:spPr bwMode="auto">
-                <a:xfrm>
-                  <a:off x="797" y="3004"/>
-                  <a:ext cx="576" cy="0"/>
-                </a:xfrm>
-                <a:prstGeom prst="line">
-                  <a:avLst/>
-                </a:prstGeom>
-                <a:noFill/>
-                <a:ln w="9525">
-                  <a:solidFill>
-                    <a:schemeClr val="tx1"/>
-                  </a:solidFill>
-                  <a:round/>
-                  <a:headEnd/>
-                  <a:tailEnd/>
-                </a:ln>
-              </p:spPr>
-              <p:txBody>
-                <a:bodyPr wrap="none" lIns="92075" tIns="46038" rIns="92075" bIns="46038" anchor="ctr"/>
-                <a:lstStyle/>
-                <a:p>
-                  <a:endParaRPr lang="en-US"/>
-                </a:p>
-              </p:txBody>
-            </p:sp>
-            <p:sp>
-              <p:nvSpPr>
-                <p:cNvPr id="31789" name="Line 8"/>
-                <p:cNvSpPr>
-                  <a:spLocks noChangeShapeType="1"/>
-                </p:cNvSpPr>
-                <p:nvPr/>
-              </p:nvSpPr>
-              <p:spPr bwMode="auto">
-                <a:xfrm>
-                  <a:off x="625" y="2544"/>
-                  <a:ext cx="0" cy="230"/>
-                </a:xfrm>
-                <a:prstGeom prst="line">
-                  <a:avLst/>
-                </a:prstGeom>
-                <a:noFill/>
-                <a:ln w="9525">
-                  <a:solidFill>
-                    <a:schemeClr val="tx1"/>
-                  </a:solidFill>
-                  <a:round/>
-                  <a:headEnd/>
-                  <a:tailEnd/>
-                </a:ln>
-              </p:spPr>
-              <p:txBody>
-                <a:bodyPr wrap="none" lIns="92075" tIns="46038" rIns="92075" bIns="46038" anchor="ctr"/>
-                <a:lstStyle/>
-                <a:p>
-                  <a:endParaRPr lang="en-US"/>
-                </a:p>
-              </p:txBody>
-            </p:sp>
-            <p:sp>
-              <p:nvSpPr>
-                <p:cNvPr id="31790" name="Line 9"/>
-                <p:cNvSpPr>
-                  <a:spLocks noChangeShapeType="1"/>
-                </p:cNvSpPr>
-                <p:nvPr/>
-              </p:nvSpPr>
-              <p:spPr bwMode="auto">
-                <a:xfrm>
-                  <a:off x="1545" y="2544"/>
-                  <a:ext cx="0" cy="230"/>
-                </a:xfrm>
-                <a:prstGeom prst="line">
-                  <a:avLst/>
-                </a:prstGeom>
-                <a:noFill/>
-                <a:ln w="9525">
-                  <a:solidFill>
-                    <a:schemeClr val="tx1"/>
-                  </a:solidFill>
-                  <a:round/>
-                  <a:headEnd/>
-                  <a:tailEnd/>
-                </a:ln>
-              </p:spPr>
-              <p:txBody>
-                <a:bodyPr wrap="none" lIns="92075" tIns="46038" rIns="92075" bIns="46038" anchor="ctr"/>
-                <a:lstStyle/>
-                <a:p>
-                  <a:endParaRPr lang="en-US"/>
-                </a:p>
-              </p:txBody>
-            </p:sp>
-            <p:sp>
-              <p:nvSpPr>
-                <p:cNvPr id="31791" name="Line 10"/>
-                <p:cNvSpPr>
-                  <a:spLocks noChangeShapeType="1"/>
-                </p:cNvSpPr>
-                <p:nvPr/>
-              </p:nvSpPr>
-              <p:spPr bwMode="auto">
-                <a:xfrm>
-                  <a:off x="797" y="2774"/>
-                  <a:ext cx="0" cy="230"/>
-                </a:xfrm>
-                <a:prstGeom prst="line">
-                  <a:avLst/>
-                </a:prstGeom>
-                <a:noFill/>
-                <a:ln w="9525">
-                  <a:solidFill>
-                    <a:schemeClr val="tx1"/>
-                  </a:solidFill>
-                  <a:round/>
-                  <a:headEnd/>
-                  <a:tailEnd/>
-                </a:ln>
-              </p:spPr>
-              <p:txBody>
-                <a:bodyPr wrap="none" lIns="92075" tIns="46038" rIns="92075" bIns="46038" anchor="ctr"/>
-                <a:lstStyle/>
-                <a:p>
-                  <a:endParaRPr lang="en-US"/>
-                </a:p>
-              </p:txBody>
-            </p:sp>
-            <p:sp>
-              <p:nvSpPr>
-                <p:cNvPr id="31792" name="Line 11"/>
-                <p:cNvSpPr>
-                  <a:spLocks noChangeShapeType="1"/>
-                </p:cNvSpPr>
-                <p:nvPr/>
-              </p:nvSpPr>
-              <p:spPr bwMode="auto">
-                <a:xfrm>
-                  <a:off x="1373" y="2774"/>
-                  <a:ext cx="0" cy="230"/>
-                </a:xfrm>
-                <a:prstGeom prst="line">
-                  <a:avLst/>
-                </a:prstGeom>
-                <a:noFill/>
-                <a:ln w="9525">
-                  <a:solidFill>
-                    <a:schemeClr val="tx1"/>
-                  </a:solidFill>
-                  <a:round/>
-                  <a:headEnd/>
-                  <a:tailEnd/>
-                </a:ln>
-              </p:spPr>
-              <p:txBody>
-                <a:bodyPr wrap="none" lIns="92075" tIns="46038" rIns="92075" bIns="46038" anchor="ctr"/>
-                <a:lstStyle/>
-                <a:p>
-                  <a:endParaRPr lang="en-US"/>
-                </a:p>
-              </p:txBody>
-            </p:sp>
-            <p:sp>
-              <p:nvSpPr>
-                <p:cNvPr id="31793" name="Line 12"/>
-                <p:cNvSpPr>
-                  <a:spLocks noChangeShapeType="1"/>
-                </p:cNvSpPr>
-                <p:nvPr/>
-              </p:nvSpPr>
-              <p:spPr bwMode="auto">
-                <a:xfrm>
-                  <a:off x="624" y="2774"/>
-                  <a:ext cx="173" cy="0"/>
-                </a:xfrm>
-                <a:prstGeom prst="line">
-                  <a:avLst/>
-                </a:prstGeom>
-                <a:noFill/>
-                <a:ln w="9525">
-                  <a:solidFill>
-                    <a:schemeClr val="tx1"/>
-                  </a:solidFill>
-                  <a:round/>
-                  <a:headEnd/>
-                  <a:tailEnd/>
-                </a:ln>
-              </p:spPr>
-              <p:txBody>
-                <a:bodyPr wrap="none" lIns="92075" tIns="46038" rIns="92075" bIns="46038" anchor="ctr"/>
-                <a:lstStyle/>
-                <a:p>
-                  <a:endParaRPr lang="en-US"/>
-                </a:p>
-              </p:txBody>
-            </p:sp>
-            <p:sp>
-              <p:nvSpPr>
-                <p:cNvPr id="31794" name="Line 13"/>
-                <p:cNvSpPr>
-                  <a:spLocks noChangeShapeType="1"/>
-                </p:cNvSpPr>
-                <p:nvPr/>
-              </p:nvSpPr>
-              <p:spPr bwMode="auto">
-                <a:xfrm>
-                  <a:off x="1372" y="2774"/>
-                  <a:ext cx="173" cy="0"/>
-                </a:xfrm>
-                <a:prstGeom prst="line">
-                  <a:avLst/>
-                </a:prstGeom>
-                <a:noFill/>
-                <a:ln w="9525">
-                  <a:solidFill>
-                    <a:schemeClr val="tx1"/>
-                  </a:solidFill>
-                  <a:round/>
-                  <a:headEnd/>
-                  <a:tailEnd/>
-                </a:ln>
-              </p:spPr>
-              <p:txBody>
-                <a:bodyPr wrap="none" lIns="92075" tIns="46038" rIns="92075" bIns="46038" anchor="ctr"/>
-                <a:lstStyle/>
-                <a:p>
-                  <a:endParaRPr lang="en-US"/>
-                </a:p>
-              </p:txBody>
-            </p:sp>
-          </p:grpSp>
-          <p:sp>
-            <p:nvSpPr>
-              <p:cNvPr id="31785" name="Text Box 14"/>
-              <p:cNvSpPr txBox="1">
-                <a:spLocks noChangeArrowheads="1"/>
-              </p:cNvSpPr>
-              <p:nvPr/>
-            </p:nvSpPr>
-            <p:spPr bwMode="auto">
-              <a:xfrm>
-                <a:off x="899" y="2784"/>
-                <a:ext cx="374" cy="204"/>
-              </a:xfrm>
-              <a:prstGeom prst="rect">
-                <a:avLst/>
-              </a:prstGeom>
-              <a:noFill/>
-              <a:ln w="9525">
-                <a:noFill/>
-                <a:miter lim="800000"/>
-                <a:headEnd/>
-                <a:tailEnd/>
-              </a:ln>
-            </p:spPr>
-            <p:txBody>
-              <a:bodyPr wrap="none" lIns="92075" tIns="46038" rIns="92075" bIns="46038">
-                <a:spAutoFit/>
-              </a:bodyPr>
-              <a:lstStyle/>
-              <a:p>
-                <a:r>
-                  <a:rPr lang="en-US" sz="1500" dirty="0"/>
-                  <a:t>C#/</a:t>
-                </a:r>
-                <a:r>
-                  <a:rPr lang="en-US" sz="1500" dirty="0">
-                    <a:latin typeface="Consolas" panose="020B0609020204030204" pitchFamily="49" charset="0"/>
-                  </a:rPr>
-                  <a:t>0</a:t>
-                </a:r>
-              </a:p>
-            </p:txBody>
-          </p:sp>
-          <p:sp>
-            <p:nvSpPr>
-              <p:cNvPr id="31786" name="Text Box 15"/>
-              <p:cNvSpPr txBox="1">
-                <a:spLocks noChangeArrowheads="1"/>
-              </p:cNvSpPr>
-              <p:nvPr/>
-            </p:nvSpPr>
-            <p:spPr bwMode="auto">
-              <a:xfrm>
-                <a:off x="807" y="2557"/>
-                <a:ext cx="554" cy="202"/>
-              </a:xfrm>
-              <a:prstGeom prst="rect">
-                <a:avLst/>
-              </a:prstGeom>
-              <a:noFill/>
-              <a:ln w="9525">
-                <a:noFill/>
-                <a:miter lim="800000"/>
-                <a:headEnd/>
-                <a:tailEnd/>
-              </a:ln>
-            </p:spPr>
-            <p:txBody>
-              <a:bodyPr wrap="none" lIns="92075" tIns="46038" rIns="92075" bIns="46038">
-                <a:spAutoFit/>
-              </a:bodyPr>
-              <a:lstStyle/>
-              <a:p>
-                <a:r>
-                  <a:rPr lang="en-US" sz="1500"/>
-                  <a:t>C# </a:t>
-                </a:r>
-                <a:r>
-                  <a:rPr lang="en-US" sz="1500">
-                    <a:sym typeface="Symbol" pitchFamily="18" charset="2"/>
-                  </a:rPr>
-                  <a:t> M</a:t>
-                </a:r>
-              </a:p>
-            </p:txBody>
-          </p:sp>
-        </p:grpSp>
-        <p:grpSp>
-          <p:nvGrpSpPr>
-            <p:cNvPr id="31751" name="Group 16"/>
-            <p:cNvGrpSpPr>
-              <a:grpSpLocks/>
-            </p:cNvGrpSpPr>
-            <p:nvPr/>
-          </p:nvGrpSpPr>
-          <p:grpSpPr bwMode="auto">
-            <a:xfrm>
-              <a:off x="3854450" y="3336925"/>
-              <a:ext cx="1462088" cy="730250"/>
-              <a:chOff x="624" y="2544"/>
-              <a:chExt cx="921" cy="460"/>
-            </a:xfrm>
-          </p:grpSpPr>
-          <p:grpSp>
-            <p:nvGrpSpPr>
-              <p:cNvPr id="31773" name="Group 17"/>
-              <p:cNvGrpSpPr>
-                <a:grpSpLocks/>
-              </p:cNvGrpSpPr>
-              <p:nvPr/>
-            </p:nvGrpSpPr>
-            <p:grpSpPr bwMode="auto">
-              <a:xfrm>
-                <a:off x="624" y="2544"/>
-                <a:ext cx="921" cy="460"/>
-                <a:chOff x="624" y="2544"/>
-                <a:chExt cx="921" cy="460"/>
-              </a:xfrm>
-            </p:grpSpPr>
-            <p:sp>
-              <p:nvSpPr>
-                <p:cNvPr id="31776" name="Line 18"/>
-                <p:cNvSpPr>
-                  <a:spLocks noChangeShapeType="1"/>
-                </p:cNvSpPr>
-                <p:nvPr/>
-              </p:nvSpPr>
-              <p:spPr bwMode="auto">
-                <a:xfrm>
-                  <a:off x="624" y="2544"/>
-                  <a:ext cx="921" cy="0"/>
-                </a:xfrm>
-                <a:prstGeom prst="line">
-                  <a:avLst/>
-                </a:prstGeom>
-                <a:noFill/>
-                <a:ln w="9525">
-                  <a:solidFill>
-                    <a:schemeClr val="tx1"/>
-                  </a:solidFill>
-                  <a:round/>
-                  <a:headEnd/>
-                  <a:tailEnd/>
-                </a:ln>
-              </p:spPr>
-              <p:txBody>
-                <a:bodyPr wrap="none" lIns="92075" tIns="46038" rIns="92075" bIns="46038" anchor="ctr"/>
-                <a:lstStyle/>
-                <a:p>
-                  <a:endParaRPr lang="en-US"/>
-                </a:p>
-              </p:txBody>
-            </p:sp>
-            <p:sp>
-              <p:nvSpPr>
-                <p:cNvPr id="31777" name="Line 19"/>
-                <p:cNvSpPr>
-                  <a:spLocks noChangeShapeType="1"/>
-                </p:cNvSpPr>
-                <p:nvPr/>
-              </p:nvSpPr>
-              <p:spPr bwMode="auto">
-                <a:xfrm>
-                  <a:off x="797" y="3004"/>
-                  <a:ext cx="576" cy="0"/>
-                </a:xfrm>
-                <a:prstGeom prst="line">
-                  <a:avLst/>
-                </a:prstGeom>
-                <a:noFill/>
-                <a:ln w="9525">
-                  <a:solidFill>
-                    <a:schemeClr val="tx1"/>
-                  </a:solidFill>
-                  <a:round/>
-                  <a:headEnd/>
-                  <a:tailEnd/>
-                </a:ln>
-              </p:spPr>
-              <p:txBody>
-                <a:bodyPr wrap="none" lIns="92075" tIns="46038" rIns="92075" bIns="46038" anchor="ctr"/>
-                <a:lstStyle/>
-                <a:p>
-                  <a:endParaRPr lang="en-US"/>
-                </a:p>
-              </p:txBody>
-            </p:sp>
-            <p:sp>
-              <p:nvSpPr>
-                <p:cNvPr id="31778" name="Line 20"/>
-                <p:cNvSpPr>
-                  <a:spLocks noChangeShapeType="1"/>
-                </p:cNvSpPr>
-                <p:nvPr/>
-              </p:nvSpPr>
-              <p:spPr bwMode="auto">
-                <a:xfrm>
-                  <a:off x="625" y="2544"/>
-                  <a:ext cx="0" cy="230"/>
-                </a:xfrm>
-                <a:prstGeom prst="line">
-                  <a:avLst/>
-                </a:prstGeom>
-                <a:noFill/>
-                <a:ln w="9525">
-                  <a:solidFill>
-                    <a:schemeClr val="tx1"/>
-                  </a:solidFill>
-                  <a:round/>
-                  <a:headEnd/>
-                  <a:tailEnd/>
-                </a:ln>
-              </p:spPr>
-              <p:txBody>
-                <a:bodyPr wrap="none" lIns="92075" tIns="46038" rIns="92075" bIns="46038" anchor="ctr"/>
-                <a:lstStyle/>
-                <a:p>
-                  <a:endParaRPr lang="en-US"/>
-                </a:p>
-              </p:txBody>
-            </p:sp>
-            <p:sp>
-              <p:nvSpPr>
-                <p:cNvPr id="31779" name="Line 21"/>
-                <p:cNvSpPr>
-                  <a:spLocks noChangeShapeType="1"/>
-                </p:cNvSpPr>
-                <p:nvPr/>
-              </p:nvSpPr>
-              <p:spPr bwMode="auto">
-                <a:xfrm>
-                  <a:off x="1545" y="2544"/>
-                  <a:ext cx="0" cy="230"/>
-                </a:xfrm>
-                <a:prstGeom prst="line">
-                  <a:avLst/>
-                </a:prstGeom>
-                <a:noFill/>
-                <a:ln w="9525">
-                  <a:solidFill>
-                    <a:schemeClr val="tx1"/>
-                  </a:solidFill>
-                  <a:round/>
-                  <a:headEnd/>
-                  <a:tailEnd/>
-                </a:ln>
-              </p:spPr>
-              <p:txBody>
-                <a:bodyPr wrap="none" lIns="92075" tIns="46038" rIns="92075" bIns="46038" anchor="ctr"/>
-                <a:lstStyle/>
-                <a:p>
-                  <a:endParaRPr lang="en-US"/>
-                </a:p>
-              </p:txBody>
-            </p:sp>
-            <p:sp>
-              <p:nvSpPr>
-                <p:cNvPr id="31780" name="Line 22"/>
-                <p:cNvSpPr>
-                  <a:spLocks noChangeShapeType="1"/>
-                </p:cNvSpPr>
-                <p:nvPr/>
-              </p:nvSpPr>
-              <p:spPr bwMode="auto">
-                <a:xfrm>
-                  <a:off x="797" y="2774"/>
-                  <a:ext cx="0" cy="230"/>
-                </a:xfrm>
-                <a:prstGeom prst="line">
-                  <a:avLst/>
-                </a:prstGeom>
-                <a:noFill/>
-                <a:ln w="9525">
-                  <a:solidFill>
-                    <a:schemeClr val="tx1"/>
-                  </a:solidFill>
-                  <a:round/>
-                  <a:headEnd/>
-                  <a:tailEnd/>
-                </a:ln>
-              </p:spPr>
-              <p:txBody>
-                <a:bodyPr wrap="none" lIns="92075" tIns="46038" rIns="92075" bIns="46038" anchor="ctr"/>
-                <a:lstStyle/>
-                <a:p>
-                  <a:endParaRPr lang="en-US"/>
-                </a:p>
-              </p:txBody>
-            </p:sp>
-            <p:sp>
-              <p:nvSpPr>
-                <p:cNvPr id="31781" name="Line 23"/>
-                <p:cNvSpPr>
-                  <a:spLocks noChangeShapeType="1"/>
-                </p:cNvSpPr>
-                <p:nvPr/>
-              </p:nvSpPr>
-              <p:spPr bwMode="auto">
-                <a:xfrm>
-                  <a:off x="1373" y="2774"/>
-                  <a:ext cx="0" cy="230"/>
-                </a:xfrm>
-                <a:prstGeom prst="line">
-                  <a:avLst/>
-                </a:prstGeom>
-                <a:noFill/>
-                <a:ln w="9525">
-                  <a:solidFill>
-                    <a:schemeClr val="tx1"/>
-                  </a:solidFill>
-                  <a:round/>
-                  <a:headEnd/>
-                  <a:tailEnd/>
-                </a:ln>
-              </p:spPr>
-              <p:txBody>
-                <a:bodyPr wrap="none" lIns="92075" tIns="46038" rIns="92075" bIns="46038" anchor="ctr"/>
-                <a:lstStyle/>
-                <a:p>
-                  <a:endParaRPr lang="en-US"/>
-                </a:p>
-              </p:txBody>
-            </p:sp>
-            <p:sp>
-              <p:nvSpPr>
-                <p:cNvPr id="31782" name="Line 24"/>
-                <p:cNvSpPr>
-                  <a:spLocks noChangeShapeType="1"/>
-                </p:cNvSpPr>
-                <p:nvPr/>
-              </p:nvSpPr>
-              <p:spPr bwMode="auto">
-                <a:xfrm>
-                  <a:off x="624" y="2774"/>
-                  <a:ext cx="173" cy="0"/>
-                </a:xfrm>
-                <a:prstGeom prst="line">
-                  <a:avLst/>
-                </a:prstGeom>
-                <a:noFill/>
-                <a:ln w="9525">
-                  <a:solidFill>
-                    <a:schemeClr val="tx1"/>
-                  </a:solidFill>
-                  <a:round/>
-                  <a:headEnd/>
-                  <a:tailEnd/>
-                </a:ln>
-              </p:spPr>
-              <p:txBody>
-                <a:bodyPr wrap="none" lIns="92075" tIns="46038" rIns="92075" bIns="46038" anchor="ctr"/>
-                <a:lstStyle/>
-                <a:p>
-                  <a:endParaRPr lang="en-US"/>
-                </a:p>
-              </p:txBody>
-            </p:sp>
-            <p:sp>
-              <p:nvSpPr>
-                <p:cNvPr id="31783" name="Line 25"/>
-                <p:cNvSpPr>
-                  <a:spLocks noChangeShapeType="1"/>
-                </p:cNvSpPr>
-                <p:nvPr/>
-              </p:nvSpPr>
-              <p:spPr bwMode="auto">
-                <a:xfrm>
-                  <a:off x="1372" y="2774"/>
-                  <a:ext cx="173" cy="0"/>
-                </a:xfrm>
-                <a:prstGeom prst="line">
-                  <a:avLst/>
-                </a:prstGeom>
-                <a:noFill/>
-                <a:ln w="9525">
-                  <a:solidFill>
-                    <a:schemeClr val="tx1"/>
-                  </a:solidFill>
-                  <a:round/>
-                  <a:headEnd/>
-                  <a:tailEnd/>
-                </a:ln>
-              </p:spPr>
-              <p:txBody>
-                <a:bodyPr wrap="none" lIns="92075" tIns="46038" rIns="92075" bIns="46038" anchor="ctr"/>
-                <a:lstStyle/>
-                <a:p>
-                  <a:endParaRPr lang="en-US"/>
-                </a:p>
-              </p:txBody>
-            </p:sp>
-          </p:grpSp>
-          <p:sp>
-            <p:nvSpPr>
-              <p:cNvPr id="31774" name="Text Box 26"/>
-              <p:cNvSpPr txBox="1">
-                <a:spLocks noChangeArrowheads="1"/>
-              </p:cNvSpPr>
-              <p:nvPr/>
-            </p:nvSpPr>
-            <p:spPr bwMode="auto">
-              <a:xfrm>
-                <a:off x="976" y="2784"/>
-                <a:ext cx="216" cy="202"/>
-              </a:xfrm>
-              <a:prstGeom prst="rect">
-                <a:avLst/>
-              </a:prstGeom>
-              <a:noFill/>
-              <a:ln w="9525">
-                <a:noFill/>
-                <a:miter lim="800000"/>
-                <a:headEnd/>
-                <a:tailEnd/>
-              </a:ln>
-            </p:spPr>
-            <p:txBody>
-              <a:bodyPr wrap="none" lIns="92075" tIns="46038" rIns="92075" bIns="46038">
-                <a:spAutoFit/>
-              </a:bodyPr>
-              <a:lstStyle/>
-              <a:p>
-                <a:r>
-                  <a:rPr lang="en-US" sz="1500"/>
-                  <a:t>M</a:t>
-                </a:r>
-              </a:p>
-            </p:txBody>
-          </p:sp>
-          <p:sp>
-            <p:nvSpPr>
-              <p:cNvPr id="31775" name="Text Box 27"/>
-              <p:cNvSpPr txBox="1">
-                <a:spLocks noChangeArrowheads="1"/>
-              </p:cNvSpPr>
-              <p:nvPr/>
-            </p:nvSpPr>
-            <p:spPr bwMode="auto">
-              <a:xfrm>
-                <a:off x="755" y="2557"/>
-                <a:ext cx="659" cy="204"/>
-              </a:xfrm>
-              <a:prstGeom prst="rect">
-                <a:avLst/>
-              </a:prstGeom>
-              <a:noFill/>
-              <a:ln w="9525">
-                <a:noFill/>
-                <a:miter lim="800000"/>
-                <a:headEnd/>
-                <a:tailEnd/>
-              </a:ln>
-            </p:spPr>
-            <p:txBody>
-              <a:bodyPr wrap="none" lIns="92075" tIns="46038" rIns="92075" bIns="46038">
-                <a:spAutoFit/>
-              </a:bodyPr>
-              <a:lstStyle/>
-              <a:p>
-                <a:r>
-                  <a:rPr lang="en-US" sz="1500" dirty="0"/>
-                  <a:t>C#/</a:t>
-                </a:r>
-                <a:r>
-                  <a:rPr lang="en-US" sz="1500" dirty="0">
-                    <a:latin typeface="Consolas" panose="020B0609020204030204" pitchFamily="49" charset="0"/>
-                  </a:rPr>
-                  <a:t>0</a:t>
-                </a:r>
-                <a:r>
-                  <a:rPr lang="en-US" sz="1500" dirty="0"/>
-                  <a:t> </a:t>
-                </a:r>
-                <a:r>
-                  <a:rPr lang="en-US" sz="1500" dirty="0">
-                    <a:sym typeface="Symbol" pitchFamily="18" charset="2"/>
-                  </a:rPr>
-                  <a:t> M</a:t>
-                </a:r>
-              </a:p>
-            </p:txBody>
-          </p:sp>
-        </p:grpSp>
-        <p:grpSp>
-          <p:nvGrpSpPr>
-            <p:cNvPr id="31752" name="Group 28"/>
-            <p:cNvGrpSpPr>
-              <a:grpSpLocks/>
-            </p:cNvGrpSpPr>
-            <p:nvPr/>
-          </p:nvGrpSpPr>
-          <p:grpSpPr bwMode="auto">
-            <a:xfrm>
-              <a:off x="5041900" y="2971800"/>
-              <a:ext cx="1462088" cy="730250"/>
-              <a:chOff x="624" y="2544"/>
-              <a:chExt cx="921" cy="460"/>
-            </a:xfrm>
-          </p:grpSpPr>
-          <p:grpSp>
-            <p:nvGrpSpPr>
-              <p:cNvPr id="31762" name="Group 29"/>
-              <p:cNvGrpSpPr>
-                <a:grpSpLocks/>
-              </p:cNvGrpSpPr>
-              <p:nvPr/>
-            </p:nvGrpSpPr>
-            <p:grpSpPr bwMode="auto">
-              <a:xfrm>
-                <a:off x="624" y="2544"/>
-                <a:ext cx="921" cy="460"/>
-                <a:chOff x="624" y="2544"/>
-                <a:chExt cx="921" cy="460"/>
-              </a:xfrm>
-            </p:grpSpPr>
-            <p:sp>
-              <p:nvSpPr>
-                <p:cNvPr id="31765" name="Line 30"/>
-                <p:cNvSpPr>
-                  <a:spLocks noChangeShapeType="1"/>
-                </p:cNvSpPr>
-                <p:nvPr/>
-              </p:nvSpPr>
-              <p:spPr bwMode="auto">
-                <a:xfrm>
-                  <a:off x="624" y="2544"/>
-                  <a:ext cx="921" cy="0"/>
-                </a:xfrm>
-                <a:prstGeom prst="line">
-                  <a:avLst/>
-                </a:prstGeom>
-                <a:noFill/>
-                <a:ln w="9525">
-                  <a:solidFill>
-                    <a:schemeClr val="tx1"/>
-                  </a:solidFill>
-                  <a:round/>
-                  <a:headEnd/>
-                  <a:tailEnd/>
-                </a:ln>
-              </p:spPr>
-              <p:txBody>
-                <a:bodyPr wrap="none" lIns="92075" tIns="46038" rIns="92075" bIns="46038" anchor="ctr"/>
-                <a:lstStyle/>
-                <a:p>
-                  <a:endParaRPr lang="en-US"/>
-                </a:p>
-              </p:txBody>
-            </p:sp>
-            <p:sp>
-              <p:nvSpPr>
-                <p:cNvPr id="31766" name="Line 31"/>
-                <p:cNvSpPr>
-                  <a:spLocks noChangeShapeType="1"/>
-                </p:cNvSpPr>
-                <p:nvPr/>
-              </p:nvSpPr>
-              <p:spPr bwMode="auto">
-                <a:xfrm>
-                  <a:off x="797" y="3004"/>
-                  <a:ext cx="576" cy="0"/>
-                </a:xfrm>
-                <a:prstGeom prst="line">
-                  <a:avLst/>
-                </a:prstGeom>
-                <a:noFill/>
-                <a:ln w="9525">
-                  <a:solidFill>
-                    <a:schemeClr val="tx1"/>
-                  </a:solidFill>
-                  <a:round/>
-                  <a:headEnd/>
-                  <a:tailEnd/>
-                </a:ln>
-              </p:spPr>
-              <p:txBody>
-                <a:bodyPr wrap="none" lIns="92075" tIns="46038" rIns="92075" bIns="46038" anchor="ctr"/>
-                <a:lstStyle/>
-                <a:p>
-                  <a:endParaRPr lang="en-US"/>
-                </a:p>
-              </p:txBody>
-            </p:sp>
-            <p:sp>
-              <p:nvSpPr>
-                <p:cNvPr id="31767" name="Line 32"/>
-                <p:cNvSpPr>
-                  <a:spLocks noChangeShapeType="1"/>
-                </p:cNvSpPr>
-                <p:nvPr/>
-              </p:nvSpPr>
-              <p:spPr bwMode="auto">
-                <a:xfrm>
-                  <a:off x="625" y="2544"/>
-                  <a:ext cx="0" cy="230"/>
-                </a:xfrm>
-                <a:prstGeom prst="line">
-                  <a:avLst/>
-                </a:prstGeom>
-                <a:noFill/>
-                <a:ln w="9525">
-                  <a:solidFill>
-                    <a:schemeClr val="tx1"/>
-                  </a:solidFill>
-                  <a:round/>
-                  <a:headEnd/>
-                  <a:tailEnd/>
-                </a:ln>
-              </p:spPr>
-              <p:txBody>
-                <a:bodyPr wrap="none" lIns="92075" tIns="46038" rIns="92075" bIns="46038" anchor="ctr"/>
-                <a:lstStyle/>
-                <a:p>
-                  <a:endParaRPr lang="en-US"/>
-                </a:p>
-              </p:txBody>
-            </p:sp>
-            <p:sp>
-              <p:nvSpPr>
-                <p:cNvPr id="31768" name="Line 33"/>
-                <p:cNvSpPr>
-                  <a:spLocks noChangeShapeType="1"/>
-                </p:cNvSpPr>
-                <p:nvPr/>
-              </p:nvSpPr>
-              <p:spPr bwMode="auto">
-                <a:xfrm>
-                  <a:off x="1545" y="2544"/>
-                  <a:ext cx="0" cy="230"/>
-                </a:xfrm>
-                <a:prstGeom prst="line">
-                  <a:avLst/>
-                </a:prstGeom>
-                <a:noFill/>
-                <a:ln w="9525">
-                  <a:solidFill>
-                    <a:schemeClr val="tx1"/>
-                  </a:solidFill>
-                  <a:round/>
-                  <a:headEnd/>
-                  <a:tailEnd/>
-                </a:ln>
-              </p:spPr>
-              <p:txBody>
-                <a:bodyPr wrap="none" lIns="92075" tIns="46038" rIns="92075" bIns="46038" anchor="ctr"/>
-                <a:lstStyle/>
-                <a:p>
-                  <a:endParaRPr lang="en-US"/>
-                </a:p>
-              </p:txBody>
-            </p:sp>
-            <p:sp>
-              <p:nvSpPr>
-                <p:cNvPr id="31769" name="Line 34"/>
-                <p:cNvSpPr>
-                  <a:spLocks noChangeShapeType="1"/>
-                </p:cNvSpPr>
-                <p:nvPr/>
-              </p:nvSpPr>
-              <p:spPr bwMode="auto">
-                <a:xfrm>
-                  <a:off x="797" y="2774"/>
-                  <a:ext cx="0" cy="230"/>
-                </a:xfrm>
-                <a:prstGeom prst="line">
-                  <a:avLst/>
-                </a:prstGeom>
-                <a:noFill/>
-                <a:ln w="9525">
-                  <a:solidFill>
-                    <a:schemeClr val="tx1"/>
-                  </a:solidFill>
-                  <a:round/>
-                  <a:headEnd/>
-                  <a:tailEnd/>
-                </a:ln>
-              </p:spPr>
-              <p:txBody>
-                <a:bodyPr wrap="none" lIns="92075" tIns="46038" rIns="92075" bIns="46038" anchor="ctr"/>
-                <a:lstStyle/>
-                <a:p>
-                  <a:endParaRPr lang="en-US"/>
-                </a:p>
-              </p:txBody>
-            </p:sp>
-            <p:sp>
-              <p:nvSpPr>
-                <p:cNvPr id="31770" name="Line 35"/>
-                <p:cNvSpPr>
-                  <a:spLocks noChangeShapeType="1"/>
-                </p:cNvSpPr>
-                <p:nvPr/>
-              </p:nvSpPr>
-              <p:spPr bwMode="auto">
-                <a:xfrm>
-                  <a:off x="1373" y="2774"/>
-                  <a:ext cx="0" cy="230"/>
-                </a:xfrm>
-                <a:prstGeom prst="line">
-                  <a:avLst/>
-                </a:prstGeom>
-                <a:noFill/>
-                <a:ln w="9525">
-                  <a:solidFill>
-                    <a:schemeClr val="tx1"/>
-                  </a:solidFill>
-                  <a:round/>
-                  <a:headEnd/>
-                  <a:tailEnd/>
-                </a:ln>
-              </p:spPr>
-              <p:txBody>
-                <a:bodyPr wrap="none" lIns="92075" tIns="46038" rIns="92075" bIns="46038" anchor="ctr"/>
-                <a:lstStyle/>
-                <a:p>
-                  <a:endParaRPr lang="en-US"/>
-                </a:p>
-              </p:txBody>
-            </p:sp>
-            <p:sp>
-              <p:nvSpPr>
-                <p:cNvPr id="31771" name="Line 36"/>
-                <p:cNvSpPr>
-                  <a:spLocks noChangeShapeType="1"/>
-                </p:cNvSpPr>
-                <p:nvPr/>
-              </p:nvSpPr>
-              <p:spPr bwMode="auto">
-                <a:xfrm>
-                  <a:off x="624" y="2774"/>
-                  <a:ext cx="173" cy="0"/>
-                </a:xfrm>
-                <a:prstGeom prst="line">
-                  <a:avLst/>
-                </a:prstGeom>
-                <a:noFill/>
-                <a:ln w="9525">
-                  <a:solidFill>
-                    <a:schemeClr val="tx1"/>
-                  </a:solidFill>
-                  <a:round/>
-                  <a:headEnd/>
-                  <a:tailEnd/>
-                </a:ln>
-              </p:spPr>
-              <p:txBody>
-                <a:bodyPr wrap="none" lIns="92075" tIns="46038" rIns="92075" bIns="46038" anchor="ctr"/>
-                <a:lstStyle/>
-                <a:p>
-                  <a:endParaRPr lang="en-US"/>
-                </a:p>
-              </p:txBody>
-            </p:sp>
-            <p:sp>
-              <p:nvSpPr>
-                <p:cNvPr id="31772" name="Line 37"/>
-                <p:cNvSpPr>
-                  <a:spLocks noChangeShapeType="1"/>
-                </p:cNvSpPr>
-                <p:nvPr/>
-              </p:nvSpPr>
-              <p:spPr bwMode="auto">
-                <a:xfrm>
-                  <a:off x="1372" y="2774"/>
-                  <a:ext cx="173" cy="0"/>
-                </a:xfrm>
-                <a:prstGeom prst="line">
-                  <a:avLst/>
-                </a:prstGeom>
-                <a:noFill/>
-                <a:ln w="9525">
-                  <a:solidFill>
-                    <a:schemeClr val="tx1"/>
-                  </a:solidFill>
-                  <a:round/>
-                  <a:headEnd/>
-                  <a:tailEnd/>
-                </a:ln>
-              </p:spPr>
-              <p:txBody>
-                <a:bodyPr wrap="none" lIns="92075" tIns="46038" rIns="92075" bIns="46038" anchor="ctr"/>
-                <a:lstStyle/>
-                <a:p>
-                  <a:endParaRPr lang="en-US"/>
-                </a:p>
-              </p:txBody>
-            </p:sp>
-          </p:grpSp>
-          <p:sp>
-            <p:nvSpPr>
-              <p:cNvPr id="31763" name="Text Box 38"/>
-              <p:cNvSpPr txBox="1">
-                <a:spLocks noChangeArrowheads="1"/>
-              </p:cNvSpPr>
-              <p:nvPr/>
-            </p:nvSpPr>
-            <p:spPr bwMode="auto">
-              <a:xfrm>
-                <a:off x="976" y="2784"/>
-                <a:ext cx="216" cy="202"/>
-              </a:xfrm>
-              <a:prstGeom prst="rect">
-                <a:avLst/>
-              </a:prstGeom>
-              <a:noFill/>
-              <a:ln w="9525">
-                <a:noFill/>
-                <a:miter lim="800000"/>
-                <a:headEnd/>
-                <a:tailEnd/>
-              </a:ln>
-            </p:spPr>
-            <p:txBody>
-              <a:bodyPr wrap="none" lIns="92075" tIns="46038" rIns="92075" bIns="46038">
-                <a:spAutoFit/>
-              </a:bodyPr>
-              <a:lstStyle/>
-              <a:p>
-                <a:r>
-                  <a:rPr lang="en-US" sz="1500"/>
-                  <a:t>M</a:t>
-                </a:r>
-              </a:p>
-            </p:txBody>
-          </p:sp>
-          <p:sp>
-            <p:nvSpPr>
-              <p:cNvPr id="31764" name="Text Box 39"/>
-              <p:cNvSpPr txBox="1">
-                <a:spLocks noChangeArrowheads="1"/>
-              </p:cNvSpPr>
-              <p:nvPr/>
-            </p:nvSpPr>
-            <p:spPr bwMode="auto">
-              <a:xfrm>
-                <a:off x="807" y="2557"/>
-                <a:ext cx="554" cy="202"/>
-              </a:xfrm>
-              <a:prstGeom prst="rect">
-                <a:avLst/>
-              </a:prstGeom>
-              <a:noFill/>
-              <a:ln w="9525">
-                <a:noFill/>
-                <a:miter lim="800000"/>
-                <a:headEnd/>
-                <a:tailEnd/>
-              </a:ln>
-            </p:spPr>
-            <p:txBody>
-              <a:bodyPr wrap="none" lIns="92075" tIns="46038" rIns="92075" bIns="46038">
-                <a:spAutoFit/>
-              </a:bodyPr>
-              <a:lstStyle/>
-              <a:p>
-                <a:r>
-                  <a:rPr lang="en-US" sz="1500"/>
-                  <a:t>C# </a:t>
-                </a:r>
-                <a:r>
-                  <a:rPr lang="en-US" sz="1500">
-                    <a:sym typeface="Symbol" pitchFamily="18" charset="2"/>
-                  </a:rPr>
-                  <a:t> M</a:t>
-                </a:r>
-              </a:p>
-            </p:txBody>
-          </p:sp>
-        </p:grpSp>
-        <p:sp>
-          <p:nvSpPr>
-            <p:cNvPr id="31753" name="Text Box 40"/>
-            <p:cNvSpPr txBox="1">
-              <a:spLocks noChangeArrowheads="1"/>
-            </p:cNvSpPr>
-            <p:nvPr/>
-          </p:nvSpPr>
-          <p:spPr bwMode="auto">
-            <a:xfrm>
-              <a:off x="1474209" y="3886200"/>
-              <a:ext cx="1248932" cy="400752"/>
-            </a:xfrm>
-            <a:prstGeom prst="rect">
-              <a:avLst/>
-            </a:prstGeom>
-            <a:noFill/>
-            <a:ln w="9525">
-              <a:noFill/>
-              <a:miter lim="800000"/>
-              <a:headEnd/>
-              <a:tailEnd/>
-            </a:ln>
-          </p:spPr>
-          <p:txBody>
-            <a:bodyPr wrap="none" lIns="92075" tIns="46038" rIns="92075" bIns="46038">
-              <a:spAutoFit/>
-            </a:bodyPr>
-            <a:lstStyle/>
-            <a:p>
-              <a:r>
-                <a:rPr lang="en-US" sz="2000" dirty="0"/>
-                <a:t>Write this</a:t>
-              </a:r>
-            </a:p>
-          </p:txBody>
-        </p:sp>
-        <p:sp>
-          <p:nvSpPr>
-            <p:cNvPr id="31755" name="Text Box 42"/>
-            <p:cNvSpPr txBox="1">
-              <a:spLocks noChangeArrowheads="1"/>
-            </p:cNvSpPr>
-            <p:nvPr/>
-          </p:nvSpPr>
-          <p:spPr bwMode="auto">
-            <a:xfrm>
-              <a:off x="6095583" y="3962400"/>
-              <a:ext cx="1353384" cy="400752"/>
-            </a:xfrm>
-            <a:prstGeom prst="rect">
-              <a:avLst/>
-            </a:prstGeom>
-            <a:noFill/>
-            <a:ln w="9525">
-              <a:noFill/>
-              <a:miter lim="800000"/>
-              <a:headEnd/>
-              <a:tailEnd/>
-            </a:ln>
-          </p:spPr>
-          <p:txBody>
-            <a:bodyPr wrap="none" lIns="92075" tIns="46038" rIns="92075" bIns="46038">
-              <a:spAutoFit/>
-            </a:bodyPr>
-            <a:lstStyle/>
-            <a:p>
-              <a:r>
-                <a:rPr lang="en-US" sz="2000" dirty="0"/>
-                <a:t>To get this</a:t>
-              </a:r>
-            </a:p>
-          </p:txBody>
-        </p:sp>
-        <p:sp>
-          <p:nvSpPr>
-            <p:cNvPr id="31756" name="AutoShape 43"/>
-            <p:cNvSpPr>
-              <a:spLocks noChangeArrowheads="1"/>
-            </p:cNvSpPr>
-            <p:nvPr/>
-          </p:nvSpPr>
-          <p:spPr bwMode="auto">
-            <a:xfrm>
-              <a:off x="4538663" y="3970338"/>
-              <a:ext cx="92075" cy="92075"/>
-            </a:xfrm>
-            <a:prstGeom prst="diamond">
-              <a:avLst/>
-            </a:prstGeom>
-            <a:noFill/>
-            <a:ln w="9525">
-              <a:noFill/>
-              <a:miter lim="800000"/>
-              <a:headEnd/>
-              <a:tailEnd/>
-            </a:ln>
-          </p:spPr>
-          <p:txBody>
-            <a:bodyPr wrap="none" lIns="92075" tIns="46038" rIns="92075" bIns="46038" anchor="ctr"/>
-            <a:lstStyle/>
-            <a:p>
-              <a:endParaRPr lang="en-US"/>
-            </a:p>
-          </p:txBody>
-        </p:sp>
-        <p:sp>
-          <p:nvSpPr>
-            <p:cNvPr id="31757" name="AutoShape 44"/>
-            <p:cNvSpPr>
-              <a:spLocks noChangeArrowheads="1"/>
-            </p:cNvSpPr>
-            <p:nvPr/>
-          </p:nvSpPr>
-          <p:spPr bwMode="auto">
-            <a:xfrm>
-              <a:off x="3352800" y="3613150"/>
-              <a:ext cx="92075" cy="92075"/>
-            </a:xfrm>
-            <a:prstGeom prst="diamond">
-              <a:avLst/>
-            </a:prstGeom>
-            <a:noFill/>
-            <a:ln w="9525">
-              <a:noFill/>
-              <a:miter lim="800000"/>
-              <a:headEnd/>
-              <a:tailEnd/>
-            </a:ln>
-          </p:spPr>
-          <p:txBody>
-            <a:bodyPr wrap="none" lIns="92075" tIns="46038" rIns="92075" bIns="46038" anchor="ctr"/>
-            <a:lstStyle/>
-            <a:p>
-              <a:endParaRPr lang="en-US"/>
-            </a:p>
-          </p:txBody>
-        </p:sp>
-        <p:sp>
-          <p:nvSpPr>
-            <p:cNvPr id="31758" name="AutoShape 45"/>
-            <p:cNvSpPr>
-              <a:spLocks noChangeArrowheads="1"/>
-            </p:cNvSpPr>
-            <p:nvPr/>
-          </p:nvSpPr>
-          <p:spPr bwMode="auto">
-            <a:xfrm>
-              <a:off x="5715000" y="3613150"/>
-              <a:ext cx="92075" cy="92075"/>
-            </a:xfrm>
-            <a:prstGeom prst="diamond">
-              <a:avLst/>
-            </a:prstGeom>
-            <a:noFill/>
-            <a:ln w="9525">
-              <a:noFill/>
-              <a:miter lim="800000"/>
-              <a:headEnd/>
-              <a:tailEnd/>
-            </a:ln>
-          </p:spPr>
-          <p:txBody>
-            <a:bodyPr wrap="none" lIns="92075" tIns="46038" rIns="92075" bIns="46038" anchor="ctr"/>
-            <a:lstStyle/>
-            <a:p>
-              <a:endParaRPr lang="en-US"/>
-            </a:p>
-          </p:txBody>
-        </p:sp>
-        <p:cxnSp>
-          <p:nvCxnSpPr>
-            <p:cNvPr id="31759" name="AutoShape 46"/>
-            <p:cNvCxnSpPr>
-              <a:cxnSpLocks noChangeShapeType="1"/>
-              <a:stCxn id="31753" idx="3"/>
-              <a:endCxn id="31757" idx="2"/>
-            </p:cNvCxnSpPr>
-            <p:nvPr/>
-          </p:nvCxnSpPr>
-          <p:spPr bwMode="auto">
-            <a:xfrm flipV="1">
-              <a:off x="2723141" y="3705225"/>
-              <a:ext cx="675697" cy="381351"/>
-            </a:xfrm>
-            <a:prstGeom prst="bentConnector2">
-              <a:avLst/>
-            </a:prstGeom>
-            <a:noFill/>
-            <a:ln w="9525">
-              <a:solidFill>
-                <a:schemeClr val="tx1"/>
-              </a:solidFill>
-              <a:miter lim="800000"/>
-              <a:headEnd/>
-              <a:tailEnd type="triangle" w="med" len="med"/>
-            </a:ln>
-          </p:spPr>
-        </p:cxnSp>
-        <p:cxnSp>
-          <p:nvCxnSpPr>
-            <p:cNvPr id="31760" name="AutoShape 47"/>
-            <p:cNvCxnSpPr>
-              <a:cxnSpLocks noChangeShapeType="1"/>
-              <a:stCxn id="53" idx="3"/>
-              <a:endCxn id="60" idx="2"/>
-            </p:cNvCxnSpPr>
-            <p:nvPr/>
-          </p:nvCxnSpPr>
-          <p:spPr bwMode="auto">
-            <a:xfrm flipV="1">
-              <a:off x="3961642" y="4800543"/>
-              <a:ext cx="624899" cy="279610"/>
-            </a:xfrm>
-            <a:prstGeom prst="bentConnector2">
-              <a:avLst/>
-            </a:prstGeom>
-            <a:noFill/>
-            <a:ln w="9525">
-              <a:solidFill>
-                <a:schemeClr val="tx1"/>
-              </a:solidFill>
-              <a:miter lim="800000"/>
-              <a:headEnd/>
-              <a:tailEnd type="triangle" w="med" len="med"/>
-            </a:ln>
-          </p:spPr>
-        </p:cxnSp>
-        <p:cxnSp>
-          <p:nvCxnSpPr>
-            <p:cNvPr id="31761" name="AutoShape 48"/>
-            <p:cNvCxnSpPr>
-              <a:cxnSpLocks noChangeShapeType="1"/>
-              <a:stCxn id="31755" idx="1"/>
-              <a:endCxn id="31758" idx="2"/>
-            </p:cNvCxnSpPr>
-            <p:nvPr/>
-          </p:nvCxnSpPr>
-          <p:spPr bwMode="auto">
-            <a:xfrm rot="10800000">
-              <a:off x="5761039" y="3705226"/>
-              <a:ext cx="334545" cy="457551"/>
-            </a:xfrm>
-            <a:prstGeom prst="bentConnector2">
-              <a:avLst/>
-            </a:prstGeom>
-            <a:noFill/>
-            <a:ln w="9525">
-              <a:solidFill>
-                <a:schemeClr val="tx1"/>
-              </a:solidFill>
-              <a:miter lim="800000"/>
-              <a:headEnd/>
-              <a:tailEnd type="triangle" w="med" len="med"/>
-            </a:ln>
-          </p:spPr>
-        </p:cxnSp>
-        <p:sp>
-          <p:nvSpPr>
-            <p:cNvPr id="60" name="Flowchart: Off-page Connector 59"/>
-            <p:cNvSpPr/>
-            <p:nvPr/>
-          </p:nvSpPr>
-          <p:spPr bwMode="auto">
-            <a:xfrm>
-              <a:off x="4129341" y="4069023"/>
-              <a:ext cx="914400" cy="731520"/>
-            </a:xfrm>
-            <a:prstGeom prst="flowChartOffpageConnector">
-              <a:avLst/>
-            </a:prstGeom>
-            <a:noFill/>
-            <a:ln w="9525">
-              <a:solidFill>
-                <a:schemeClr val="tx1"/>
-              </a:solidFill>
-              <a:round/>
-              <a:headEnd/>
-              <a:tailEnd/>
-            </a:ln>
-          </p:spPr>
-          <p:txBody>
-            <a:bodyPr wrap="none" lIns="92075" tIns="46038" rIns="92075" bIns="46038" rtlCol="0" anchor="ctr"/>
-            <a:lstStyle/>
-            <a:p>
-              <a:pPr algn="ctr"/>
-              <a:r>
-                <a:rPr lang="en-US" sz="1500" dirty="0"/>
-                <a:t>M</a:t>
-              </a:r>
-            </a:p>
-          </p:txBody>
-        </p:sp>
-        <p:sp>
-          <p:nvSpPr>
-            <p:cNvPr id="53" name="Text Box 41">
-              <a:extLst>
-                <a:ext uri="{FF2B5EF4-FFF2-40B4-BE49-F238E27FC236}">
-                  <a16:creationId xmlns:a16="http://schemas.microsoft.com/office/drawing/2014/main" id="{85FA7B70-01B0-4108-ACC7-CD355810AAE8}"/>
-                </a:ext>
-              </a:extLst>
-            </p:cNvPr>
-            <p:cNvSpPr txBox="1">
-              <a:spLocks noChangeArrowheads="1"/>
-            </p:cNvSpPr>
-            <p:nvPr/>
-          </p:nvSpPr>
-          <p:spPr bwMode="auto">
-            <a:xfrm>
-              <a:off x="2148646" y="4572000"/>
-              <a:ext cx="1812996" cy="1016305"/>
-            </a:xfrm>
-            <a:prstGeom prst="rect">
-              <a:avLst/>
-            </a:prstGeom>
-            <a:noFill/>
-            <a:ln w="9525">
-              <a:noFill/>
-              <a:miter lim="800000"/>
-              <a:headEnd/>
-              <a:tailEnd/>
-            </a:ln>
-          </p:spPr>
-          <p:txBody>
-            <a:bodyPr wrap="none" lIns="92075" tIns="46038" rIns="92075" bIns="46038">
-              <a:spAutoFit/>
-            </a:bodyPr>
-            <a:lstStyle/>
-            <a:p>
-              <a:r>
-                <a:rPr lang="en-US" sz="2000" dirty="0"/>
-                <a:t>Compile using</a:t>
-              </a:r>
-            </a:p>
-            <a:p>
-              <a:r>
-                <a:rPr lang="en-US" sz="2000" dirty="0"/>
-                <a:t>the compiler</a:t>
-              </a:r>
-            </a:p>
-            <a:p>
-              <a:r>
-                <a:rPr lang="en-US" sz="2000" dirty="0"/>
-                <a:t>from step 2</a:t>
-              </a:r>
-            </a:p>
-          </p:txBody>
-        </p:sp>
-      </p:grpSp>
-    </p:spTree>
-  </p:cSld>
-  <p:clrMapOvr>
-    <a:masterClrMapping/>
-  </p:clrMapOvr>
-</p:sld>
-</file>
-
-<file path=ppt/slides/slide32.xml><?xml version="1.0" encoding="utf-8"?>
-<p:sld xmlns:a="http://schemas.openxmlformats.org/drawingml/2006/main" xmlns:r="http://schemas.openxmlformats.org/officeDocument/2006/relationships" xmlns:p="http://schemas.openxmlformats.org/presentationml/2006/main">
-  <p:cSld>
-    <p:spTree>
-      <p:nvGrpSpPr>
-        <p:cNvPr id="1" name=""/>
-        <p:cNvGrpSpPr/>
-        <p:nvPr/>
-      </p:nvGrpSpPr>
-      <p:grpSpPr>
-        <a:xfrm>
-          <a:off x="0" y="0"/>
-          <a:ext cx="0" cy="0"/>
-          <a:chOff x="0" y="0"/>
-          <a:chExt cx="0" cy="0"/>
-        </a:xfrm>
-      </p:grpSpPr>
-      <p:sp>
-        <p:nvSpPr>
           <p:cNvPr id="32770" name="Footer Placeholder 3"/>
           <p:cNvSpPr>
             <a:spLocks noGrp="1"/>
@@ -31215,7 +29379,7 @@
             <a:fld id="{6C04F3E6-ED30-4455-B409-5033B564222C}" type="slidenum">
               <a:rPr lang="en-US" smtClean="0"/>
               <a:pPr/>
-              <a:t>32</a:t>
+              <a:t>31</a:t>
             </a:fld>
             <a:endParaRPr lang="en-US"/>
           </a:p>
@@ -31307,7 +29471,7 @@
 </p:sld>
 </file>
 
-<file path=ppt/slides/slide33.xml><?xml version="1.0" encoding="utf-8"?>
+<file path=ppt/slides/slide32.xml><?xml version="1.0" encoding="utf-8"?>
 <p:sld xmlns:a="http://schemas.openxmlformats.org/drawingml/2006/main" xmlns:r="http://schemas.openxmlformats.org/officeDocument/2006/relationships" xmlns:p="http://schemas.openxmlformats.org/presentationml/2006/main">
   <p:cSld>
     <p:spTree>
@@ -31372,7 +29536,7 @@
             <a:fld id="{6B892657-F6C6-4A90-B818-B298D3E265B8}" type="slidenum">
               <a:rPr lang="en-US" smtClean="0"/>
               <a:pPr/>
-              <a:t>33</a:t>
+              <a:t>32</a:t>
             </a:fld>
             <a:endParaRPr lang="en-US"/>
           </a:p>
@@ -33063,7 +31227,7 @@
 </p:sld>
 </file>
 
-<file path=ppt/slides/slide34.xml><?xml version="1.0" encoding="utf-8"?>
+<file path=ppt/slides/slide33.xml><?xml version="1.0" encoding="utf-8"?>
 <p:sld xmlns:a="http://schemas.openxmlformats.org/drawingml/2006/main" xmlns:r="http://schemas.openxmlformats.org/officeDocument/2006/relationships" xmlns:p="http://schemas.openxmlformats.org/presentationml/2006/main">
   <p:cSld>
     <p:spTree>
@@ -33128,7 +31292,7 @@
             <a:fld id="{380FA25E-8339-4B04-9CBA-5DFCC61268EA}" type="slidenum">
               <a:rPr lang="en-US" smtClean="0"/>
               <a:pPr/>
-              <a:t>34</a:t>
+              <a:t>33</a:t>
             </a:fld>
             <a:endParaRPr lang="en-US"/>
           </a:p>
@@ -33408,7 +31572,7 @@
 </p:sld>
 </file>
 
-<file path=ppt/slides/slide35.xml><?xml version="1.0" encoding="utf-8"?>
+<file path=ppt/slides/slide34.xml><?xml version="1.0" encoding="utf-8"?>
 <p:sld xmlns:a="http://schemas.openxmlformats.org/drawingml/2006/main" xmlns:r="http://schemas.openxmlformats.org/officeDocument/2006/relationships" xmlns:p="http://schemas.openxmlformats.org/presentationml/2006/main">
   <p:cSld>
     <p:spTree>
@@ -33473,7 +31637,7 @@
             <a:fld id="{664EEF59-2466-41B1-A25C-7DF9D683EC78}" type="slidenum">
               <a:rPr lang="en-US" smtClean="0"/>
               <a:pPr/>
-              <a:t>35</a:t>
+              <a:t>34</a:t>
             </a:fld>
             <a:endParaRPr lang="en-US"/>
           </a:p>
@@ -34292,7 +32456,7 @@
 </p:sld>
 </file>
 
-<file path=ppt/slides/slide36.xml><?xml version="1.0" encoding="utf-8"?>
+<file path=ppt/slides/slide35.xml><?xml version="1.0" encoding="utf-8"?>
 <p:sld xmlns:a="http://schemas.openxmlformats.org/drawingml/2006/main" xmlns:r="http://schemas.openxmlformats.org/officeDocument/2006/relationships" xmlns:p="http://schemas.openxmlformats.org/presentationml/2006/main">
   <p:cSld>
     <p:spTree>
@@ -34357,7 +32521,7 @@
             <a:fld id="{BA60C916-759F-41D1-AB4C-ACDEAA9E9251}" type="slidenum">
               <a:rPr lang="en-US" smtClean="0"/>
               <a:pPr/>
-              <a:t>36</a:t>
+              <a:t>35</a:t>
             </a:fld>
             <a:endParaRPr lang="en-US"/>
           </a:p>
@@ -36561,6 +34725,160 @@
 </p:sld>
 </file>
 
+<file path=ppt/slides/slide36.xml><?xml version="1.0" encoding="utf-8"?>
+<p:sld xmlns:a="http://schemas.openxmlformats.org/drawingml/2006/main" xmlns:r="http://schemas.openxmlformats.org/officeDocument/2006/relationships" xmlns:p="http://schemas.openxmlformats.org/presentationml/2006/main">
+  <p:cSld>
+    <p:spTree>
+      <p:nvGrpSpPr>
+        <p:cNvPr id="1" name=""/>
+        <p:cNvGrpSpPr/>
+        <p:nvPr/>
+      </p:nvGrpSpPr>
+      <p:grpSpPr>
+        <a:xfrm>
+          <a:off x="0" y="0"/>
+          <a:ext cx="0" cy="0"/>
+          <a:chOff x="0" y="0"/>
+          <a:chExt cx="0" cy="0"/>
+        </a:xfrm>
+      </p:grpSpPr>
+      <p:sp>
+        <p:nvSpPr>
+          <p:cNvPr id="37890" name="Footer Placeholder 3"/>
+          <p:cNvSpPr>
+            <a:spLocks noGrp="1"/>
+          </p:cNvSpPr>
+          <p:nvPr>
+            <p:ph type="ftr" sz="quarter" idx="10"/>
+          </p:nvPr>
+        </p:nvSpPr>
+        <p:spPr>
+          <a:noFill/>
+        </p:spPr>
+        <p:txBody>
+          <a:bodyPr/>
+          <a:lstStyle/>
+          <a:p>
+            <a:r>
+              <a:rPr lang="en-US"/>
+              <a:t>©SoftMoore Consulting</a:t>
+            </a:r>
+          </a:p>
+        </p:txBody>
+      </p:sp>
+      <p:sp>
+        <p:nvSpPr>
+          <p:cNvPr id="37891" name="Slide Number Placeholder 4"/>
+          <p:cNvSpPr>
+            <a:spLocks noGrp="1"/>
+          </p:cNvSpPr>
+          <p:nvPr>
+            <p:ph type="sldNum" sz="quarter" idx="11"/>
+          </p:nvPr>
+        </p:nvSpPr>
+        <p:spPr>
+          <a:noFill/>
+        </p:spPr>
+        <p:txBody>
+          <a:bodyPr/>
+          <a:lstStyle/>
+          <a:p>
+            <a:r>
+              <a:rPr lang="en-US"/>
+              <a:t>Slide </a:t>
+            </a:r>
+            <a:fld id="{7E969F8D-5909-4C9F-840E-A6F55F635B13}" type="slidenum">
+              <a:rPr lang="en-US" smtClean="0"/>
+              <a:pPr/>
+              <a:t>36</a:t>
+            </a:fld>
+            <a:endParaRPr lang="en-US"/>
+          </a:p>
+        </p:txBody>
+      </p:sp>
+      <p:sp>
+        <p:nvSpPr>
+          <p:cNvPr id="37892" name="Rectangle 2"/>
+          <p:cNvSpPr>
+            <a:spLocks noGrp="1" noChangeArrowheads="1"/>
+          </p:cNvSpPr>
+          <p:nvPr>
+            <p:ph type="title"/>
+          </p:nvPr>
+        </p:nvSpPr>
+        <p:spPr/>
+        <p:txBody>
+          <a:bodyPr/>
+          <a:lstStyle/>
+          <a:p>
+            <a:r>
+              <a:rPr lang="en-US"/>
+              <a:t>Compiler Project</a:t>
+            </a:r>
+          </a:p>
+        </p:txBody>
+      </p:sp>
+      <p:sp>
+        <p:nvSpPr>
+          <p:cNvPr id="37893" name="Rectangle 43"/>
+          <p:cNvSpPr>
+            <a:spLocks noGrp="1" noChangeArrowheads="1"/>
+          </p:cNvSpPr>
+          <p:nvPr>
+            <p:ph type="body" idx="1"/>
+          </p:nvPr>
+        </p:nvSpPr>
+        <p:spPr/>
+        <p:txBody>
+          <a:bodyPr/>
+          <a:lstStyle/>
+          <a:p>
+            <a:r>
+              <a:rPr lang="en-US" dirty="0"/>
+              <a:t>Source language: CPRL</a:t>
+            </a:r>
+          </a:p>
+          <a:p>
+            <a:r>
+              <a:rPr lang="en-US" dirty="0"/>
+              <a:t>Target language: CVM/A, assembly language for the CPRL Virtual Machine (CVM)</a:t>
+            </a:r>
+          </a:p>
+          <a:p>
+            <a:r>
+              <a:rPr lang="en-US" dirty="0"/>
+              <a:t>You will write a CPRL-to-CVM/A compiler in Java.</a:t>
+            </a:r>
+          </a:p>
+          <a:p>
+            <a:r>
+              <a:rPr lang="en-US" dirty="0"/>
+              <a:t>I will provide a CVM assembler.</a:t>
+            </a:r>
+          </a:p>
+          <a:p>
+            <a:r>
+              <a:rPr lang="en-US" dirty="0"/>
+              <a:t>When you compile your compiler, you will have a</a:t>
+            </a:r>
+            <a:br>
+              <a:rPr lang="en-US" dirty="0"/>
+            </a:br>
+            <a:r>
+              <a:rPr lang="en-US" dirty="0"/>
+              <a:t>CPRL-to-CVM/A compiler that runs on a Java virtual machine.</a:t>
+            </a:r>
+          </a:p>
+        </p:txBody>
+      </p:sp>
+    </p:spTree>
+  </p:cSld>
+  <p:clrMapOvr>
+    <a:masterClrMapping/>
+  </p:clrMapOvr>
+</p:sld>
+</file>
+
 <file path=ppt/slides/slide37.xml><?xml version="1.0" encoding="utf-8"?>
 <p:sld xmlns:a="http://schemas.openxmlformats.org/drawingml/2006/main" xmlns:r="http://schemas.openxmlformats.org/officeDocument/2006/relationships" xmlns:p="http://schemas.openxmlformats.org/presentationml/2006/main">
   <p:cSld>
@@ -36627,160 +34945,6 @@
               <a:rPr lang="en-US" smtClean="0"/>
               <a:pPr/>
               <a:t>37</a:t>
-            </a:fld>
-            <a:endParaRPr lang="en-US"/>
-          </a:p>
-        </p:txBody>
-      </p:sp>
-      <p:sp>
-        <p:nvSpPr>
-          <p:cNvPr id="37892" name="Rectangle 2"/>
-          <p:cNvSpPr>
-            <a:spLocks noGrp="1" noChangeArrowheads="1"/>
-          </p:cNvSpPr>
-          <p:nvPr>
-            <p:ph type="title"/>
-          </p:nvPr>
-        </p:nvSpPr>
-        <p:spPr/>
-        <p:txBody>
-          <a:bodyPr/>
-          <a:lstStyle/>
-          <a:p>
-            <a:r>
-              <a:rPr lang="en-US"/>
-              <a:t>Compiler Project</a:t>
-            </a:r>
-          </a:p>
-        </p:txBody>
-      </p:sp>
-      <p:sp>
-        <p:nvSpPr>
-          <p:cNvPr id="37893" name="Rectangle 43"/>
-          <p:cNvSpPr>
-            <a:spLocks noGrp="1" noChangeArrowheads="1"/>
-          </p:cNvSpPr>
-          <p:nvPr>
-            <p:ph type="body" idx="1"/>
-          </p:nvPr>
-        </p:nvSpPr>
-        <p:spPr/>
-        <p:txBody>
-          <a:bodyPr/>
-          <a:lstStyle/>
-          <a:p>
-            <a:r>
-              <a:rPr lang="en-US" dirty="0"/>
-              <a:t>Source language: CPRL</a:t>
-            </a:r>
-          </a:p>
-          <a:p>
-            <a:r>
-              <a:rPr lang="en-US" dirty="0"/>
-              <a:t>Target language: CVM/A, assembly language for the CPRL Virtual Machine (CVM)</a:t>
-            </a:r>
-          </a:p>
-          <a:p>
-            <a:r>
-              <a:rPr lang="en-US" dirty="0"/>
-              <a:t>You will write a CPRL-to-CVM/A compiler in Java.</a:t>
-            </a:r>
-          </a:p>
-          <a:p>
-            <a:r>
-              <a:rPr lang="en-US" dirty="0"/>
-              <a:t>I will provide a CVM assembler.</a:t>
-            </a:r>
-          </a:p>
-          <a:p>
-            <a:r>
-              <a:rPr lang="en-US" dirty="0"/>
-              <a:t>When you compile your compiler, you will have a</a:t>
-            </a:r>
-            <a:br>
-              <a:rPr lang="en-US" dirty="0"/>
-            </a:br>
-            <a:r>
-              <a:rPr lang="en-US" dirty="0"/>
-              <a:t>CPRL-to-CVM/A compiler that runs on a Java virtual machine.</a:t>
-            </a:r>
-          </a:p>
-        </p:txBody>
-      </p:sp>
-    </p:spTree>
-  </p:cSld>
-  <p:clrMapOvr>
-    <a:masterClrMapping/>
-  </p:clrMapOvr>
-</p:sld>
-</file>
-
-<file path=ppt/slides/slide38.xml><?xml version="1.0" encoding="utf-8"?>
-<p:sld xmlns:a="http://schemas.openxmlformats.org/drawingml/2006/main" xmlns:r="http://schemas.openxmlformats.org/officeDocument/2006/relationships" xmlns:p="http://schemas.openxmlformats.org/presentationml/2006/main">
-  <p:cSld>
-    <p:spTree>
-      <p:nvGrpSpPr>
-        <p:cNvPr id="1" name=""/>
-        <p:cNvGrpSpPr/>
-        <p:nvPr/>
-      </p:nvGrpSpPr>
-      <p:grpSpPr>
-        <a:xfrm>
-          <a:off x="0" y="0"/>
-          <a:ext cx="0" cy="0"/>
-          <a:chOff x="0" y="0"/>
-          <a:chExt cx="0" cy="0"/>
-        </a:xfrm>
-      </p:grpSpPr>
-      <p:sp>
-        <p:nvSpPr>
-          <p:cNvPr id="37890" name="Footer Placeholder 3"/>
-          <p:cNvSpPr>
-            <a:spLocks noGrp="1"/>
-          </p:cNvSpPr>
-          <p:nvPr>
-            <p:ph type="ftr" sz="quarter" idx="10"/>
-          </p:nvPr>
-        </p:nvSpPr>
-        <p:spPr>
-          <a:noFill/>
-        </p:spPr>
-        <p:txBody>
-          <a:bodyPr/>
-          <a:lstStyle/>
-          <a:p>
-            <a:r>
-              <a:rPr lang="en-US"/>
-              <a:t>©SoftMoore Consulting</a:t>
-            </a:r>
-          </a:p>
-        </p:txBody>
-      </p:sp>
-      <p:sp>
-        <p:nvSpPr>
-          <p:cNvPr id="37891" name="Slide Number Placeholder 4"/>
-          <p:cNvSpPr>
-            <a:spLocks noGrp="1"/>
-          </p:cNvSpPr>
-          <p:nvPr>
-            <p:ph type="sldNum" sz="quarter" idx="11"/>
-          </p:nvPr>
-        </p:nvSpPr>
-        <p:spPr>
-          <a:noFill/>
-        </p:spPr>
-        <p:txBody>
-          <a:bodyPr/>
-          <a:lstStyle/>
-          <a:p>
-            <a:r>
-              <a:rPr lang="en-US"/>
-              <a:t>Slide </a:t>
-            </a:r>
-            <a:fld id="{7E969F8D-5909-4C9F-840E-A6F55F635B13}" type="slidenum">
-              <a:rPr lang="en-US" smtClean="0"/>
-              <a:pPr/>
-              <a:t>38</a:t>
             </a:fld>
             <a:endParaRPr lang="en-US"/>
           </a:p>
@@ -38206,7 +36370,7 @@
 </p:sld>
 </file>
 
-<file path=ppt/slides/slide39.xml><?xml version="1.0" encoding="utf-8"?>
+<file path=ppt/slides/slide38.xml><?xml version="1.0" encoding="utf-8"?>
 <p:sld xmlns:a="http://schemas.openxmlformats.org/drawingml/2006/main" xmlns:r="http://schemas.openxmlformats.org/officeDocument/2006/relationships" xmlns:p="http://schemas.openxmlformats.org/presentationml/2006/main">
   <p:cSld>
     <p:spTree>
@@ -38271,7 +36435,7 @@
             <a:fld id="{D9553B3F-2640-4B19-8022-F68A61F7EE86}" type="slidenum">
               <a:rPr lang="en-US" smtClean="0"/>
               <a:pPr/>
-              <a:t>39</a:t>
+              <a:t>38</a:t>
             </a:fld>
             <a:endParaRPr lang="en-US"/>
           </a:p>
@@ -40662,169 +38826,7 @@
 </p:sld>
 </file>
 
-<file path=ppt/slides/slide4.xml><?xml version="1.0" encoding="utf-8"?>
-<p:sld xmlns:a="http://schemas.openxmlformats.org/drawingml/2006/main" xmlns:r="http://schemas.openxmlformats.org/officeDocument/2006/relationships" xmlns:p="http://schemas.openxmlformats.org/presentationml/2006/main">
-  <p:cSld>
-    <p:spTree>
-      <p:nvGrpSpPr>
-        <p:cNvPr id="1" name=""/>
-        <p:cNvGrpSpPr/>
-        <p:nvPr/>
-      </p:nvGrpSpPr>
-      <p:grpSpPr>
-        <a:xfrm>
-          <a:off x="0" y="0"/>
-          <a:ext cx="0" cy="0"/>
-          <a:chOff x="0" y="0"/>
-          <a:chExt cx="0" cy="0"/>
-        </a:xfrm>
-      </p:grpSpPr>
-      <p:sp>
-        <p:nvSpPr>
-          <p:cNvPr id="6146" name="Footer Placeholder 3"/>
-          <p:cNvSpPr>
-            <a:spLocks noGrp="1"/>
-          </p:cNvSpPr>
-          <p:nvPr>
-            <p:ph type="ftr" sz="quarter" idx="10"/>
-          </p:nvPr>
-        </p:nvSpPr>
-        <p:spPr>
-          <a:noFill/>
-        </p:spPr>
-        <p:txBody>
-          <a:bodyPr/>
-          <a:lstStyle/>
-          <a:p>
-            <a:r>
-              <a:rPr lang="en-US"/>
-              <a:t>©SoftMoore Consulting</a:t>
-            </a:r>
-          </a:p>
-        </p:txBody>
-      </p:sp>
-      <p:sp>
-        <p:nvSpPr>
-          <p:cNvPr id="6147" name="Slide Number Placeholder 4"/>
-          <p:cNvSpPr>
-            <a:spLocks noGrp="1"/>
-          </p:cNvSpPr>
-          <p:nvPr>
-            <p:ph type="sldNum" sz="quarter" idx="11"/>
-          </p:nvPr>
-        </p:nvSpPr>
-        <p:spPr>
-          <a:noFill/>
-        </p:spPr>
-        <p:txBody>
-          <a:bodyPr/>
-          <a:lstStyle/>
-          <a:p>
-            <a:r>
-              <a:rPr lang="en-US"/>
-              <a:t>Slide </a:t>
-            </a:r>
-            <a:fld id="{EBB95295-D5E6-403B-8E1C-6C2DF886080A}" type="slidenum">
-              <a:rPr lang="en-US" smtClean="0"/>
-              <a:pPr/>
-              <a:t>4</a:t>
-            </a:fld>
-            <a:endParaRPr lang="en-US"/>
-          </a:p>
-        </p:txBody>
-      </p:sp>
-      <p:sp>
-        <p:nvSpPr>
-          <p:cNvPr id="6148" name="Rectangle 2"/>
-          <p:cNvSpPr>
-            <a:spLocks noGrp="1" noChangeArrowheads="1"/>
-          </p:cNvSpPr>
-          <p:nvPr>
-            <p:ph type="title"/>
-          </p:nvPr>
-        </p:nvSpPr>
-        <p:spPr/>
-        <p:txBody>
-          <a:bodyPr/>
-          <a:lstStyle/>
-          <a:p>
-            <a:r>
-              <a:rPr lang="en-US" dirty="0"/>
-              <a:t>Role of Programming Languages</a:t>
-            </a:r>
-          </a:p>
-        </p:txBody>
-      </p:sp>
-      <p:sp>
-        <p:nvSpPr>
-          <p:cNvPr id="6149" name="Rectangle 3"/>
-          <p:cNvSpPr>
-            <a:spLocks noGrp="1" noChangeArrowheads="1"/>
-          </p:cNvSpPr>
-          <p:nvPr>
-            <p:ph type="body" idx="1"/>
-          </p:nvPr>
-        </p:nvSpPr>
-        <p:spPr/>
-        <p:txBody>
-          <a:bodyPr/>
-          <a:lstStyle/>
-          <a:p>
-            <a:r>
-              <a:rPr lang="en-US"/>
-              <a:t>Machine independence</a:t>
-            </a:r>
-          </a:p>
-          <a:p>
-            <a:r>
-              <a:rPr lang="en-US"/>
-              <a:t>Portability</a:t>
-            </a:r>
-          </a:p>
-          <a:p>
-            <a:r>
-              <a:rPr lang="en-US"/>
-              <a:t>Reuse</a:t>
-            </a:r>
-          </a:p>
-          <a:p>
-            <a:r>
-              <a:rPr lang="en-US"/>
-              <a:t>Abstraction</a:t>
-            </a:r>
-          </a:p>
-          <a:p>
-            <a:r>
-              <a:rPr lang="en-US"/>
-              <a:t>Communication of ideas</a:t>
-            </a:r>
-          </a:p>
-          <a:p>
-            <a:r>
-              <a:rPr lang="en-US"/>
-              <a:t>Productivity</a:t>
-            </a:r>
-          </a:p>
-          <a:p>
-            <a:r>
-              <a:rPr lang="en-US"/>
-              <a:t>Reliability (error detection)</a:t>
-            </a:r>
-          </a:p>
-          <a:p>
-            <a:endParaRPr lang="en-US"/>
-          </a:p>
-        </p:txBody>
-      </p:sp>
-    </p:spTree>
-  </p:cSld>
-  <p:clrMapOvr>
-    <a:masterClrMapping/>
-  </p:clrMapOvr>
-</p:sld>
-</file>
-
-<file path=ppt/slides/slide40.xml><?xml version="1.0" encoding="utf-8"?>
+<file path=ppt/slides/slide39.xml><?xml version="1.0" encoding="utf-8"?>
 <p:sld xmlns:a="http://schemas.openxmlformats.org/drawingml/2006/main" xmlns:r="http://schemas.openxmlformats.org/officeDocument/2006/relationships" xmlns:p="http://schemas.openxmlformats.org/presentationml/2006/main">
   <p:cSld>
     <p:spTree>
@@ -40889,7 +38891,7 @@
             <a:fld id="{886EEF83-9573-4C6A-A1DA-4BBA5A4368E3}" type="slidenum">
               <a:rPr lang="en-US" smtClean="0"/>
               <a:pPr/>
-              <a:t>40</a:t>
+              <a:t>39</a:t>
             </a:fld>
             <a:endParaRPr lang="en-US"/>
           </a:p>
@@ -41629,6 +39631,168 @@
           </p:txBody>
         </p:sp>
       </p:grpSp>
+    </p:spTree>
+  </p:cSld>
+  <p:clrMapOvr>
+    <a:masterClrMapping/>
+  </p:clrMapOvr>
+</p:sld>
+</file>
+
+<file path=ppt/slides/slide4.xml><?xml version="1.0" encoding="utf-8"?>
+<p:sld xmlns:a="http://schemas.openxmlformats.org/drawingml/2006/main" xmlns:r="http://schemas.openxmlformats.org/officeDocument/2006/relationships" xmlns:p="http://schemas.openxmlformats.org/presentationml/2006/main">
+  <p:cSld>
+    <p:spTree>
+      <p:nvGrpSpPr>
+        <p:cNvPr id="1" name=""/>
+        <p:cNvGrpSpPr/>
+        <p:nvPr/>
+      </p:nvGrpSpPr>
+      <p:grpSpPr>
+        <a:xfrm>
+          <a:off x="0" y="0"/>
+          <a:ext cx="0" cy="0"/>
+          <a:chOff x="0" y="0"/>
+          <a:chExt cx="0" cy="0"/>
+        </a:xfrm>
+      </p:grpSpPr>
+      <p:sp>
+        <p:nvSpPr>
+          <p:cNvPr id="6146" name="Footer Placeholder 3"/>
+          <p:cNvSpPr>
+            <a:spLocks noGrp="1"/>
+          </p:cNvSpPr>
+          <p:nvPr>
+            <p:ph type="ftr" sz="quarter" idx="10"/>
+          </p:nvPr>
+        </p:nvSpPr>
+        <p:spPr>
+          <a:noFill/>
+        </p:spPr>
+        <p:txBody>
+          <a:bodyPr/>
+          <a:lstStyle/>
+          <a:p>
+            <a:r>
+              <a:rPr lang="en-US"/>
+              <a:t>©SoftMoore Consulting</a:t>
+            </a:r>
+          </a:p>
+        </p:txBody>
+      </p:sp>
+      <p:sp>
+        <p:nvSpPr>
+          <p:cNvPr id="6147" name="Slide Number Placeholder 4"/>
+          <p:cNvSpPr>
+            <a:spLocks noGrp="1"/>
+          </p:cNvSpPr>
+          <p:nvPr>
+            <p:ph type="sldNum" sz="quarter" idx="11"/>
+          </p:nvPr>
+        </p:nvSpPr>
+        <p:spPr>
+          <a:noFill/>
+        </p:spPr>
+        <p:txBody>
+          <a:bodyPr/>
+          <a:lstStyle/>
+          <a:p>
+            <a:r>
+              <a:rPr lang="en-US"/>
+              <a:t>Slide </a:t>
+            </a:r>
+            <a:fld id="{EBB95295-D5E6-403B-8E1C-6C2DF886080A}" type="slidenum">
+              <a:rPr lang="en-US" smtClean="0"/>
+              <a:pPr/>
+              <a:t>4</a:t>
+            </a:fld>
+            <a:endParaRPr lang="en-US"/>
+          </a:p>
+        </p:txBody>
+      </p:sp>
+      <p:sp>
+        <p:nvSpPr>
+          <p:cNvPr id="6148" name="Rectangle 2"/>
+          <p:cNvSpPr>
+            <a:spLocks noGrp="1" noChangeArrowheads="1"/>
+          </p:cNvSpPr>
+          <p:nvPr>
+            <p:ph type="title"/>
+          </p:nvPr>
+        </p:nvSpPr>
+        <p:spPr/>
+        <p:txBody>
+          <a:bodyPr/>
+          <a:lstStyle/>
+          <a:p>
+            <a:r>
+              <a:rPr lang="en-US" dirty="0"/>
+              <a:t>Role of Programming Languages</a:t>
+            </a:r>
+          </a:p>
+        </p:txBody>
+      </p:sp>
+      <p:sp>
+        <p:nvSpPr>
+          <p:cNvPr id="6149" name="Rectangle 3"/>
+          <p:cNvSpPr>
+            <a:spLocks noGrp="1" noChangeArrowheads="1"/>
+          </p:cNvSpPr>
+          <p:nvPr>
+            <p:ph type="body" idx="1"/>
+          </p:nvPr>
+        </p:nvSpPr>
+        <p:spPr/>
+        <p:txBody>
+          <a:bodyPr/>
+          <a:lstStyle/>
+          <a:p>
+            <a:r>
+              <a:rPr lang="en-US"/>
+              <a:t>Machine independence</a:t>
+            </a:r>
+          </a:p>
+          <a:p>
+            <a:r>
+              <a:rPr lang="en-US"/>
+              <a:t>Portability</a:t>
+            </a:r>
+          </a:p>
+          <a:p>
+            <a:r>
+              <a:rPr lang="en-US"/>
+              <a:t>Reuse</a:t>
+            </a:r>
+          </a:p>
+          <a:p>
+            <a:r>
+              <a:rPr lang="en-US"/>
+              <a:t>Abstraction</a:t>
+            </a:r>
+          </a:p>
+          <a:p>
+            <a:r>
+              <a:rPr lang="en-US"/>
+              <a:t>Communication of ideas</a:t>
+            </a:r>
+          </a:p>
+          <a:p>
+            <a:r>
+              <a:rPr lang="en-US"/>
+              <a:t>Productivity</a:t>
+            </a:r>
+          </a:p>
+          <a:p>
+            <a:r>
+              <a:rPr lang="en-US"/>
+              <a:t>Reliability (error detection)</a:t>
+            </a:r>
+          </a:p>
+          <a:p>
+            <a:endParaRPr lang="en-US"/>
+          </a:p>
+        </p:txBody>
+      </p:sp>
     </p:spTree>
   </p:cSld>
   <p:clrMapOvr>

</xml_diff>

<commit_message>
updated machine targets; replaced MIPS with RISC-V
</commit_message>
<xml_diff>
--- a/PowerPoint Slides/01 - Overview of Compilers.pptx
+++ b/PowerPoint Slides/01 - Overview of Compilers.pptx
@@ -12765,10 +12765,9 @@
             <a:bodyPr wrap="none" lIns="92075" tIns="46038" rIns="92075" bIns="46038" rtlCol="0" anchor="ctr"/>
             <a:lstStyle/>
             <a:p>
-              <a:pPr algn="ctr"/>
               <a:r>
                 <a:rPr lang="en-US" sz="1500" dirty="0"/>
-                <a:t>MIPS</a:t>
+                <a:t>RISC-V</a:t>
               </a:r>
             </a:p>
           </p:txBody>
@@ -15567,10 +15566,9 @@
               <a:bodyPr wrap="none" lIns="92075" tIns="46038" rIns="92075" bIns="46038" rtlCol="0" anchor="ctr"/>
               <a:lstStyle/>
               <a:p>
-                <a:pPr algn="ctr"/>
                 <a:r>
                   <a:rPr lang="en-US" sz="1500" dirty="0"/>
-                  <a:t>MIPS</a:t>
+                  <a:t>RISC-V</a:t>
                 </a:r>
               </a:p>
             </p:txBody>

</xml_diff>